<commit_message>
worked on adding more text to the app
</commit_message>
<xml_diff>
--- a/figures/designs-for-app.pptx
+++ b/figures/designs-for-app.pptx
@@ -6,7 +6,11 @@
   </p:sldMasterIdLst>
   <p:sldIdLst>
     <p:sldId id="258" r:id="rId2"/>
-    <p:sldId id="259" r:id="rId3"/>
+    <p:sldId id="260" r:id="rId3"/>
+    <p:sldId id="262" r:id="rId4"/>
+    <p:sldId id="261" r:id="rId5"/>
+    <p:sldId id="259" r:id="rId6"/>
+    <p:sldId id="263" r:id="rId7"/>
   </p:sldIdLst>
   <p:sldSz cx="12192000" cy="6858000"/>
   <p:notesSz cx="6858000" cy="9144000"/>
@@ -14,7 +18,7 @@
     <a:defPPr>
       <a:defRPr lang="en-US"/>
     </a:defPPr>
-    <a:lvl1pPr marL="0" algn="l" defTabSz="914400" rtl="0" eaLnBrk="1" latinLnBrk="0" hangingPunct="1">
+    <a:lvl1pPr marL="0" algn="l" defTabSz="914341" rtl="0" eaLnBrk="1" latinLnBrk="0" hangingPunct="1">
       <a:defRPr sz="1800" kern="1200">
         <a:solidFill>
           <a:schemeClr val="tx1"/>
@@ -24,7 +28,7 @@
         <a:cs typeface="+mn-cs"/>
       </a:defRPr>
     </a:lvl1pPr>
-    <a:lvl2pPr marL="457200" algn="l" defTabSz="914400" rtl="0" eaLnBrk="1" latinLnBrk="0" hangingPunct="1">
+    <a:lvl2pPr marL="457171" algn="l" defTabSz="914341" rtl="0" eaLnBrk="1" latinLnBrk="0" hangingPunct="1">
       <a:defRPr sz="1800" kern="1200">
         <a:solidFill>
           <a:schemeClr val="tx1"/>
@@ -34,7 +38,7 @@
         <a:cs typeface="+mn-cs"/>
       </a:defRPr>
     </a:lvl2pPr>
-    <a:lvl3pPr marL="914400" algn="l" defTabSz="914400" rtl="0" eaLnBrk="1" latinLnBrk="0" hangingPunct="1">
+    <a:lvl3pPr marL="914341" algn="l" defTabSz="914341" rtl="0" eaLnBrk="1" latinLnBrk="0" hangingPunct="1">
       <a:defRPr sz="1800" kern="1200">
         <a:solidFill>
           <a:schemeClr val="tx1"/>
@@ -44,7 +48,7 @@
         <a:cs typeface="+mn-cs"/>
       </a:defRPr>
     </a:lvl3pPr>
-    <a:lvl4pPr marL="1371600" algn="l" defTabSz="914400" rtl="0" eaLnBrk="1" latinLnBrk="0" hangingPunct="1">
+    <a:lvl4pPr marL="1371512" algn="l" defTabSz="914341" rtl="0" eaLnBrk="1" latinLnBrk="0" hangingPunct="1">
       <a:defRPr sz="1800" kern="1200">
         <a:solidFill>
           <a:schemeClr val="tx1"/>
@@ -54,7 +58,7 @@
         <a:cs typeface="+mn-cs"/>
       </a:defRPr>
     </a:lvl4pPr>
-    <a:lvl5pPr marL="1828800" algn="l" defTabSz="914400" rtl="0" eaLnBrk="1" latinLnBrk="0" hangingPunct="1">
+    <a:lvl5pPr marL="1828683" algn="l" defTabSz="914341" rtl="0" eaLnBrk="1" latinLnBrk="0" hangingPunct="1">
       <a:defRPr sz="1800" kern="1200">
         <a:solidFill>
           <a:schemeClr val="tx1"/>
@@ -64,7 +68,7 @@
         <a:cs typeface="+mn-cs"/>
       </a:defRPr>
     </a:lvl5pPr>
-    <a:lvl6pPr marL="2286000" algn="l" defTabSz="914400" rtl="0" eaLnBrk="1" latinLnBrk="0" hangingPunct="1">
+    <a:lvl6pPr marL="2285854" algn="l" defTabSz="914341" rtl="0" eaLnBrk="1" latinLnBrk="0" hangingPunct="1">
       <a:defRPr sz="1800" kern="1200">
         <a:solidFill>
           <a:schemeClr val="tx1"/>
@@ -74,7 +78,7 @@
         <a:cs typeface="+mn-cs"/>
       </a:defRPr>
     </a:lvl6pPr>
-    <a:lvl7pPr marL="2743200" algn="l" defTabSz="914400" rtl="0" eaLnBrk="1" latinLnBrk="0" hangingPunct="1">
+    <a:lvl7pPr marL="2743024" algn="l" defTabSz="914341" rtl="0" eaLnBrk="1" latinLnBrk="0" hangingPunct="1">
       <a:defRPr sz="1800" kern="1200">
         <a:solidFill>
           <a:schemeClr val="tx1"/>
@@ -84,7 +88,7 @@
         <a:cs typeface="+mn-cs"/>
       </a:defRPr>
     </a:lvl7pPr>
-    <a:lvl8pPr marL="3200400" algn="l" defTabSz="914400" rtl="0" eaLnBrk="1" latinLnBrk="0" hangingPunct="1">
+    <a:lvl8pPr marL="3200195" algn="l" defTabSz="914341" rtl="0" eaLnBrk="1" latinLnBrk="0" hangingPunct="1">
       <a:defRPr sz="1800" kern="1200">
         <a:solidFill>
           <a:schemeClr val="tx1"/>
@@ -94,7 +98,7 @@
         <a:cs typeface="+mn-cs"/>
       </a:defRPr>
     </a:lvl8pPr>
-    <a:lvl9pPr marL="3657600" algn="l" defTabSz="914400" rtl="0" eaLnBrk="1" latinLnBrk="0" hangingPunct="1">
+    <a:lvl9pPr marL="3657366" algn="l" defTabSz="914341" rtl="0" eaLnBrk="1" latinLnBrk="0" hangingPunct="1">
       <a:defRPr sz="1800" kern="1200">
         <a:solidFill>
           <a:schemeClr val="tx1"/>
@@ -260,7 +264,7 @@
           <a:p>
             <a:fld id="{6039D67A-F6AF-0E4D-B74D-CFD23B56EE6B}" type="datetimeFigureOut">
               <a:rPr lang="en-US" smtClean="0"/>
-              <a:t>2/19/21</a:t>
+              <a:t>2/27/21</a:t>
             </a:fld>
             <a:endParaRPr lang="en-US"/>
           </a:p>
@@ -458,7 +462,7 @@
           <a:p>
             <a:fld id="{6039D67A-F6AF-0E4D-B74D-CFD23B56EE6B}" type="datetimeFigureOut">
               <a:rPr lang="en-US" smtClean="0"/>
-              <a:t>2/19/21</a:t>
+              <a:t>2/27/21</a:t>
             </a:fld>
             <a:endParaRPr lang="en-US"/>
           </a:p>
@@ -666,7 +670,7 @@
           <a:p>
             <a:fld id="{6039D67A-F6AF-0E4D-B74D-CFD23B56EE6B}" type="datetimeFigureOut">
               <a:rPr lang="en-US" smtClean="0"/>
-              <a:t>2/19/21</a:t>
+              <a:t>2/27/21</a:t>
             </a:fld>
             <a:endParaRPr lang="en-US"/>
           </a:p>
@@ -864,7 +868,7 @@
           <a:p>
             <a:fld id="{6039D67A-F6AF-0E4D-B74D-CFD23B56EE6B}" type="datetimeFigureOut">
               <a:rPr lang="en-US" smtClean="0"/>
-              <a:t>2/19/21</a:t>
+              <a:t>2/27/21</a:t>
             </a:fld>
             <a:endParaRPr lang="en-US"/>
           </a:p>
@@ -972,7 +976,7 @@
         </p:nvSpPr>
         <p:spPr>
           <a:xfrm>
-            <a:off x="831850" y="1709738"/>
+            <a:off x="831850" y="1709739"/>
             <a:ext cx="10515600" cy="2852737"/>
           </a:xfrm>
         </p:spPr>
@@ -1009,7 +1013,7 @@
         </p:nvSpPr>
         <p:spPr>
           <a:xfrm>
-            <a:off x="831850" y="4589463"/>
+            <a:off x="831850" y="4589464"/>
             <a:ext cx="10515600" cy="1500187"/>
           </a:xfrm>
         </p:spPr>
@@ -1139,7 +1143,7 @@
           <a:p>
             <a:fld id="{6039D67A-F6AF-0E4D-B74D-CFD23B56EE6B}" type="datetimeFigureOut">
               <a:rPr lang="en-US" smtClean="0"/>
-              <a:t>2/19/21</a:t>
+              <a:t>2/27/21</a:t>
             </a:fld>
             <a:endParaRPr lang="en-US"/>
           </a:p>
@@ -1404,7 +1408,7 @@
           <a:p>
             <a:fld id="{6039D67A-F6AF-0E4D-B74D-CFD23B56EE6B}" type="datetimeFigureOut">
               <a:rPr lang="en-US" smtClean="0"/>
-              <a:t>2/19/21</a:t>
+              <a:t>2/27/21</a:t>
             </a:fld>
             <a:endParaRPr lang="en-US"/>
           </a:p>
@@ -1512,7 +1516,7 @@
         </p:nvSpPr>
         <p:spPr>
           <a:xfrm>
-            <a:off x="839788" y="365125"/>
+            <a:off x="839788" y="365126"/>
             <a:ext cx="10515600" cy="1325563"/>
           </a:xfrm>
         </p:spPr>
@@ -1545,7 +1549,7 @@
         </p:nvSpPr>
         <p:spPr>
           <a:xfrm>
-            <a:off x="839788" y="1681163"/>
+            <a:off x="839789" y="1681163"/>
             <a:ext cx="5157787" cy="823912"/>
           </a:xfrm>
         </p:spPr>
@@ -1616,7 +1620,7 @@
         </p:nvSpPr>
         <p:spPr>
           <a:xfrm>
-            <a:off x="839788" y="2505075"/>
+            <a:off x="839789" y="2505075"/>
             <a:ext cx="5157787" cy="3684588"/>
           </a:xfrm>
         </p:spPr>
@@ -1816,7 +1820,7 @@
           <a:p>
             <a:fld id="{6039D67A-F6AF-0E4D-B74D-CFD23B56EE6B}" type="datetimeFigureOut">
               <a:rPr lang="en-US" smtClean="0"/>
-              <a:t>2/19/21</a:t>
+              <a:t>2/27/21</a:t>
             </a:fld>
             <a:endParaRPr lang="en-US"/>
           </a:p>
@@ -1957,7 +1961,7 @@
           <a:p>
             <a:fld id="{6039D67A-F6AF-0E4D-B74D-CFD23B56EE6B}" type="datetimeFigureOut">
               <a:rPr lang="en-US" smtClean="0"/>
-              <a:t>2/19/21</a:t>
+              <a:t>2/27/21</a:t>
             </a:fld>
             <a:endParaRPr lang="en-US"/>
           </a:p>
@@ -2070,7 +2074,7 @@
           <a:p>
             <a:fld id="{6039D67A-F6AF-0E4D-B74D-CFD23B56EE6B}" type="datetimeFigureOut">
               <a:rPr lang="en-US" smtClean="0"/>
-              <a:t>2/19/21</a:t>
+              <a:t>2/27/21</a:t>
             </a:fld>
             <a:endParaRPr lang="en-US"/>
           </a:p>
@@ -2178,7 +2182,7 @@
         </p:nvSpPr>
         <p:spPr>
           <a:xfrm>
-            <a:off x="839788" y="457200"/>
+            <a:off x="839789" y="457200"/>
             <a:ext cx="3932237" cy="1600200"/>
           </a:xfrm>
         </p:spPr>
@@ -2215,7 +2219,7 @@
         </p:nvSpPr>
         <p:spPr>
           <a:xfrm>
-            <a:off x="5183188" y="987425"/>
+            <a:off x="5183188" y="987426"/>
             <a:ext cx="6172200" cy="4873625"/>
           </a:xfrm>
         </p:spPr>
@@ -2305,7 +2309,7 @@
         </p:nvSpPr>
         <p:spPr>
           <a:xfrm>
-            <a:off x="839788" y="2057400"/>
+            <a:off x="839789" y="2057400"/>
             <a:ext cx="3932237" cy="3811588"/>
           </a:xfrm>
         </p:spPr>
@@ -2381,7 +2385,7 @@
           <a:p>
             <a:fld id="{6039D67A-F6AF-0E4D-B74D-CFD23B56EE6B}" type="datetimeFigureOut">
               <a:rPr lang="en-US" smtClean="0"/>
-              <a:t>2/19/21</a:t>
+              <a:t>2/27/21</a:t>
             </a:fld>
             <a:endParaRPr lang="en-US"/>
           </a:p>
@@ -2489,7 +2493,7 @@
         </p:nvSpPr>
         <p:spPr>
           <a:xfrm>
-            <a:off x="839788" y="457200"/>
+            <a:off x="839789" y="457200"/>
             <a:ext cx="3932237" cy="1600200"/>
           </a:xfrm>
         </p:spPr>
@@ -2526,7 +2530,7 @@
         </p:nvSpPr>
         <p:spPr>
           <a:xfrm>
-            <a:off x="5183188" y="987425"/>
+            <a:off x="5183188" y="987426"/>
             <a:ext cx="6172200" cy="4873625"/>
           </a:xfrm>
         </p:spPr>
@@ -2593,7 +2597,7 @@
         </p:nvSpPr>
         <p:spPr>
           <a:xfrm>
-            <a:off x="839788" y="2057400"/>
+            <a:off x="839789" y="2057400"/>
             <a:ext cx="3932237" cy="3811588"/>
           </a:xfrm>
         </p:spPr>
@@ -2669,7 +2673,7 @@
           <a:p>
             <a:fld id="{6039D67A-F6AF-0E4D-B74D-CFD23B56EE6B}" type="datetimeFigureOut">
               <a:rPr lang="en-US" smtClean="0"/>
-              <a:t>2/19/21</a:t>
+              <a:t>2/27/21</a:t>
             </a:fld>
             <a:endParaRPr lang="en-US"/>
           </a:p>
@@ -2782,7 +2786,7 @@
         </p:nvSpPr>
         <p:spPr>
           <a:xfrm>
-            <a:off x="838200" y="365125"/>
+            <a:off x="838200" y="365126"/>
             <a:ext cx="10515600" cy="1325563"/>
           </a:xfrm>
           <a:prstGeom prst="rect">
@@ -2887,7 +2891,7 @@
         </p:nvSpPr>
         <p:spPr>
           <a:xfrm>
-            <a:off x="838200" y="6356350"/>
+            <a:off x="838200" y="6356351"/>
             <a:ext cx="2743200" cy="365125"/>
           </a:xfrm>
           <a:prstGeom prst="rect">
@@ -2910,7 +2914,7 @@
           <a:p>
             <a:fld id="{6039D67A-F6AF-0E4D-B74D-CFD23B56EE6B}" type="datetimeFigureOut">
               <a:rPr lang="en-US" smtClean="0"/>
-              <a:t>2/19/21</a:t>
+              <a:t>2/27/21</a:t>
             </a:fld>
             <a:endParaRPr lang="en-US"/>
           </a:p>
@@ -2934,7 +2938,7 @@
         </p:nvSpPr>
         <p:spPr>
           <a:xfrm>
-            <a:off x="4038600" y="6356350"/>
+            <a:off x="4038600" y="6356351"/>
             <a:ext cx="4114800" cy="365125"/>
           </a:xfrm>
           <a:prstGeom prst="rect">
@@ -2977,7 +2981,7 @@
         </p:nvSpPr>
         <p:spPr>
           <a:xfrm>
-            <a:off x="8610600" y="6356350"/>
+            <a:off x="8610600" y="6356351"/>
             <a:ext cx="2743200" cy="365125"/>
           </a:xfrm>
           <a:prstGeom prst="rect">
@@ -3528,300 +3532,1832 @@
           <a:chExt cx="0" cy="0"/>
         </a:xfrm>
       </p:grpSpPr>
-      <p:sp>
-        <p:nvSpPr>
-          <p:cNvPr id="2" name="Rectangle 1">
-            <a:extLst>
-              <a:ext uri="{FF2B5EF4-FFF2-40B4-BE49-F238E27FC236}">
-                <a16:creationId xmlns:a16="http://schemas.microsoft.com/office/drawing/2014/main" id="{D1804843-752D-064D-8D94-EDC959C85515}"/>
-              </a:ext>
-            </a:extLst>
-          </p:cNvPr>
-          <p:cNvSpPr/>
+      <p:grpSp>
+        <p:nvGrpSpPr>
+          <p:cNvPr id="13" name="Group 12">
+            <a:extLst>
+              <a:ext uri="{FF2B5EF4-FFF2-40B4-BE49-F238E27FC236}">
+                <a16:creationId xmlns:a16="http://schemas.microsoft.com/office/drawing/2014/main" id="{65A71081-57AC-FC41-B5B0-4CAE48503744}"/>
+              </a:ext>
+            </a:extLst>
+          </p:cNvPr>
+          <p:cNvGrpSpPr/>
           <p:nvPr/>
-        </p:nvSpPr>
-        <p:spPr>
+        </p:nvGrpSpPr>
+        <p:grpSpPr>
           <a:xfrm>
-            <a:off x="242047" y="1270747"/>
-            <a:ext cx="3429000" cy="4316506"/>
+            <a:off x="31785" y="2832778"/>
+            <a:ext cx="12031258" cy="1249095"/>
+            <a:chOff x="31785" y="2832776"/>
+            <a:chExt cx="12031258" cy="1249095"/>
           </a:xfrm>
-          <a:prstGeom prst="rect">
-            <a:avLst/>
-          </a:prstGeom>
-          <a:solidFill>
-            <a:srgbClr val="EBF0F1"/>
-          </a:solidFill>
-          <a:ln>
-            <a:noFill/>
-          </a:ln>
-        </p:spPr>
-        <p:style>
-          <a:lnRef idx="2">
-            <a:schemeClr val="accent1">
-              <a:shade val="50000"/>
-            </a:schemeClr>
-          </a:lnRef>
-          <a:fillRef idx="1">
-            <a:schemeClr val="accent1"/>
-          </a:fillRef>
-          <a:effectRef idx="0">
-            <a:schemeClr val="accent1"/>
-          </a:effectRef>
-          <a:fontRef idx="minor">
-            <a:schemeClr val="lt1"/>
-          </a:fontRef>
-        </p:style>
-        <p:txBody>
-          <a:bodyPr rtlCol="0" anchor="t" anchorCtr="0"/>
-          <a:lstStyle/>
-          <a:p>
-            <a:pPr algn="ctr"/>
-            <a:endParaRPr lang="en-US" sz="2200" b="1" dirty="0">
+        </p:grpSpPr>
+        <p:pic>
+          <p:nvPicPr>
+            <p:cNvPr id="3" name="Picture 2" descr="A picture containing close&#10;&#10;Description automatically generated">
+              <a:extLst>
+                <a:ext uri="{FF2B5EF4-FFF2-40B4-BE49-F238E27FC236}">
+                  <a16:creationId xmlns:a16="http://schemas.microsoft.com/office/drawing/2014/main" id="{E2E63D66-F1DD-FA4D-A5D0-763C531AF17E}"/>
+                </a:ext>
+              </a:extLst>
+            </p:cNvPr>
+            <p:cNvPicPr>
+              <a:picLocks noChangeAspect="1"/>
+            </p:cNvPicPr>
+            <p:nvPr/>
+          </p:nvPicPr>
+          <p:blipFill>
+            <a:blip r:embed="rId2"/>
+            <a:stretch>
+              <a:fillRect/>
+            </a:stretch>
+          </p:blipFill>
+          <p:spPr>
+            <a:xfrm>
+              <a:off x="4083173" y="2832776"/>
+              <a:ext cx="1227558" cy="1249095"/>
+            </a:xfrm>
+            <a:prstGeom prst="ellipse">
+              <a:avLst/>
+            </a:prstGeom>
+          </p:spPr>
+        </p:pic>
+        <p:pic>
+          <p:nvPicPr>
+            <p:cNvPr id="4" name="Picture 3">
+              <a:extLst>
+                <a:ext uri="{FF2B5EF4-FFF2-40B4-BE49-F238E27FC236}">
+                  <a16:creationId xmlns:a16="http://schemas.microsoft.com/office/drawing/2014/main" id="{F6A4966A-2C79-8648-8644-2656F9205E31}"/>
+                </a:ext>
+              </a:extLst>
+            </p:cNvPr>
+            <p:cNvPicPr>
+              <a:picLocks noChangeAspect="1"/>
+            </p:cNvPicPr>
+            <p:nvPr/>
+          </p:nvPicPr>
+          <p:blipFill>
+            <a:blip r:embed="rId3"/>
+            <a:stretch>
+              <a:fillRect/>
+            </a:stretch>
+          </p:blipFill>
+          <p:spPr>
+            <a:xfrm>
+              <a:off x="10835485" y="2832776"/>
+              <a:ext cx="1227558" cy="1249095"/>
+            </a:xfrm>
+            <a:prstGeom prst="ellipse">
+              <a:avLst/>
+            </a:prstGeom>
+          </p:spPr>
+        </p:pic>
+        <p:pic>
+          <p:nvPicPr>
+            <p:cNvPr id="5" name="Picture 4" descr="A picture containing indoor&#10;&#10;Description automatically generated">
+              <a:extLst>
+                <a:ext uri="{FF2B5EF4-FFF2-40B4-BE49-F238E27FC236}">
+                  <a16:creationId xmlns:a16="http://schemas.microsoft.com/office/drawing/2014/main" id="{A709454D-3FCF-7F47-9C13-5560B90952A2}"/>
+                </a:ext>
+              </a:extLst>
+            </p:cNvPr>
+            <p:cNvPicPr>
+              <a:picLocks noChangeAspect="1"/>
+            </p:cNvPicPr>
+            <p:nvPr/>
+          </p:nvPicPr>
+          <p:blipFill>
+            <a:blip r:embed="rId4"/>
+            <a:stretch>
+              <a:fillRect/>
+            </a:stretch>
+          </p:blipFill>
+          <p:spPr>
+            <a:xfrm>
+              <a:off x="1382247" y="2832776"/>
+              <a:ext cx="1227558" cy="1249095"/>
+            </a:xfrm>
+            <a:prstGeom prst="ellipse">
+              <a:avLst/>
+            </a:prstGeom>
+          </p:spPr>
+        </p:pic>
+        <p:pic>
+          <p:nvPicPr>
+            <p:cNvPr id="6" name="Picture 5" descr="A picture containing indoor&#10;&#10;Description automatically generated">
+              <a:extLst>
+                <a:ext uri="{FF2B5EF4-FFF2-40B4-BE49-F238E27FC236}">
+                  <a16:creationId xmlns:a16="http://schemas.microsoft.com/office/drawing/2014/main" id="{93466475-D05B-A847-92DA-4DF7965425E4}"/>
+                </a:ext>
+              </a:extLst>
+            </p:cNvPr>
+            <p:cNvPicPr>
+              <a:picLocks noChangeAspect="1"/>
+            </p:cNvPicPr>
+            <p:nvPr/>
+          </p:nvPicPr>
+          <p:blipFill>
+            <a:blip r:embed="rId5"/>
+            <a:stretch>
+              <a:fillRect/>
+            </a:stretch>
+          </p:blipFill>
+          <p:spPr>
+            <a:xfrm>
+              <a:off x="5433635" y="2832776"/>
+              <a:ext cx="1227558" cy="1249095"/>
+            </a:xfrm>
+            <a:prstGeom prst="ellipse">
+              <a:avLst/>
+            </a:prstGeom>
+          </p:spPr>
+        </p:pic>
+        <p:pic>
+          <p:nvPicPr>
+            <p:cNvPr id="7" name="Picture 6" descr="A picture containing indoor, cup, invertebrate&#10;&#10;Description automatically generated">
+              <a:extLst>
+                <a:ext uri="{FF2B5EF4-FFF2-40B4-BE49-F238E27FC236}">
+                  <a16:creationId xmlns:a16="http://schemas.microsoft.com/office/drawing/2014/main" id="{5FED16B6-93A0-3847-818B-F007827D755E}"/>
+                </a:ext>
+              </a:extLst>
+            </p:cNvPr>
+            <p:cNvPicPr>
+              <a:picLocks noChangeAspect="1"/>
+            </p:cNvPicPr>
+            <p:nvPr/>
+          </p:nvPicPr>
+          <p:blipFill>
+            <a:blip r:embed="rId6"/>
+            <a:stretch>
+              <a:fillRect/>
+            </a:stretch>
+          </p:blipFill>
+          <p:spPr>
+            <a:xfrm>
+              <a:off x="31785" y="2832776"/>
+              <a:ext cx="1227558" cy="1249095"/>
+            </a:xfrm>
+            <a:prstGeom prst="ellipse">
+              <a:avLst/>
+            </a:prstGeom>
+          </p:spPr>
+        </p:pic>
+        <p:pic>
+          <p:nvPicPr>
+            <p:cNvPr id="8" name="Picture 7">
+              <a:extLst>
+                <a:ext uri="{FF2B5EF4-FFF2-40B4-BE49-F238E27FC236}">
+                  <a16:creationId xmlns:a16="http://schemas.microsoft.com/office/drawing/2014/main" id="{7D2CC1A8-D108-7B44-9222-EB79B4950EC9}"/>
+                </a:ext>
+              </a:extLst>
+            </p:cNvPr>
+            <p:cNvPicPr>
+              <a:picLocks noChangeAspect="1"/>
+            </p:cNvPicPr>
+            <p:nvPr/>
+          </p:nvPicPr>
+          <p:blipFill rotWithShape="1">
+            <a:blip r:embed="rId7" cstate="print">
+              <a:extLst>
+                <a:ext uri="{28A0092B-C50C-407E-A947-70E740481C1C}">
+                  <a14:useLocalDpi xmlns:a14="http://schemas.microsoft.com/office/drawing/2010/main" val="0"/>
+                </a:ext>
+              </a:extLst>
+            </a:blip>
+            <a:srcRect t="7845"/>
+            <a:stretch/>
+          </p:blipFill>
+          <p:spPr>
+            <a:xfrm>
+              <a:off x="8134560" y="2832776"/>
+              <a:ext cx="1227558" cy="1249095"/>
+            </a:xfrm>
+            <a:prstGeom prst="ellipse">
+              <a:avLst/>
+            </a:prstGeom>
+          </p:spPr>
+        </p:pic>
+        <p:pic>
+          <p:nvPicPr>
+            <p:cNvPr id="9" name="Picture 8">
+              <a:extLst>
+                <a:ext uri="{FF2B5EF4-FFF2-40B4-BE49-F238E27FC236}">
+                  <a16:creationId xmlns:a16="http://schemas.microsoft.com/office/drawing/2014/main" id="{618E1E66-B886-9948-9F2C-E29129A3FF90}"/>
+                </a:ext>
+              </a:extLst>
+            </p:cNvPr>
+            <p:cNvPicPr>
+              <a:picLocks noChangeAspect="1"/>
+            </p:cNvPicPr>
+            <p:nvPr/>
+          </p:nvPicPr>
+          <p:blipFill rotWithShape="1">
+            <a:blip r:embed="rId8" cstate="print">
+              <a:extLst>
+                <a:ext uri="{28A0092B-C50C-407E-A947-70E740481C1C}">
+                  <a14:useLocalDpi xmlns:a14="http://schemas.microsoft.com/office/drawing/2010/main" val="0"/>
+                </a:ext>
+              </a:extLst>
+            </a:blip>
+            <a:srcRect b="6968"/>
+            <a:stretch/>
+          </p:blipFill>
+          <p:spPr>
+            <a:xfrm>
+              <a:off x="6784097" y="2832776"/>
+              <a:ext cx="1227558" cy="1249095"/>
+            </a:xfrm>
+            <a:prstGeom prst="ellipse">
+              <a:avLst/>
+            </a:prstGeom>
+          </p:spPr>
+        </p:pic>
+        <p:pic>
+          <p:nvPicPr>
+            <p:cNvPr id="10" name="Picture 9">
+              <a:extLst>
+                <a:ext uri="{FF2B5EF4-FFF2-40B4-BE49-F238E27FC236}">
+                  <a16:creationId xmlns:a16="http://schemas.microsoft.com/office/drawing/2014/main" id="{94547CE0-C360-A746-B850-7CCB618E9F71}"/>
+                </a:ext>
+              </a:extLst>
+            </p:cNvPr>
+            <p:cNvPicPr>
+              <a:picLocks noChangeAspect="1"/>
+            </p:cNvPicPr>
+            <p:nvPr/>
+          </p:nvPicPr>
+          <p:blipFill rotWithShape="1">
+            <a:blip r:embed="rId9" cstate="print">
+              <a:extLst>
+                <a:ext uri="{28A0092B-C50C-407E-A947-70E740481C1C}">
+                  <a14:useLocalDpi xmlns:a14="http://schemas.microsoft.com/office/drawing/2010/main" val="0"/>
+                </a:ext>
+              </a:extLst>
+            </a:blip>
+            <a:srcRect t="4029" b="4540"/>
+            <a:stretch/>
+          </p:blipFill>
+          <p:spPr>
+            <a:xfrm>
+              <a:off x="9485022" y="2832776"/>
+              <a:ext cx="1227558" cy="1249095"/>
+            </a:xfrm>
+            <a:prstGeom prst="ellipse">
+              <a:avLst/>
+            </a:prstGeom>
+          </p:spPr>
+        </p:pic>
+        <p:pic>
+          <p:nvPicPr>
+            <p:cNvPr id="11" name="Picture 10">
+              <a:extLst>
+                <a:ext uri="{FF2B5EF4-FFF2-40B4-BE49-F238E27FC236}">
+                  <a16:creationId xmlns:a16="http://schemas.microsoft.com/office/drawing/2014/main" id="{D80C58FC-D584-4749-8DEA-D5CBF9C8E5F1}"/>
+                </a:ext>
+              </a:extLst>
+            </p:cNvPr>
+            <p:cNvPicPr>
+              <a:picLocks noChangeAspect="1"/>
+            </p:cNvPicPr>
+            <p:nvPr/>
+          </p:nvPicPr>
+          <p:blipFill rotWithShape="1">
+            <a:blip r:embed="rId10" cstate="print">
+              <a:extLst>
+                <a:ext uri="{28A0092B-C50C-407E-A947-70E740481C1C}">
+                  <a14:useLocalDpi xmlns:a14="http://schemas.microsoft.com/office/drawing/2010/main" val="0"/>
+                </a:ext>
+              </a:extLst>
+            </a:blip>
+            <a:srcRect l="5993" r="4442"/>
+            <a:stretch/>
+          </p:blipFill>
+          <p:spPr>
+            <a:xfrm>
+              <a:off x="2732710" y="2832776"/>
+              <a:ext cx="1227558" cy="1249095"/>
+            </a:xfrm>
+            <a:prstGeom prst="ellipse">
+              <a:avLst/>
+            </a:prstGeom>
+          </p:spPr>
+        </p:pic>
+      </p:grpSp>
+    </p:spTree>
+    <p:extLst>
+      <p:ext uri="{BB962C8B-B14F-4D97-AF65-F5344CB8AC3E}">
+        <p14:creationId xmlns:p14="http://schemas.microsoft.com/office/powerpoint/2010/main" val="2304779705"/>
+      </p:ext>
+    </p:extLst>
+  </p:cSld>
+  <p:clrMapOvr>
+    <a:masterClrMapping/>
+  </p:clrMapOvr>
+</p:sld>
+</file>
+
+<file path=ppt/slides/slide3.xml><?xml version="1.0" encoding="utf-8"?>
+<p:sld xmlns:a="http://schemas.openxmlformats.org/drawingml/2006/main" xmlns:r="http://schemas.openxmlformats.org/officeDocument/2006/relationships" xmlns:p="http://schemas.openxmlformats.org/presentationml/2006/main">
+  <p:cSld>
+    <p:spTree>
+      <p:nvGrpSpPr>
+        <p:cNvPr id="1" name=""/>
+        <p:cNvGrpSpPr/>
+        <p:nvPr/>
+      </p:nvGrpSpPr>
+      <p:grpSpPr>
+        <a:xfrm>
+          <a:off x="0" y="0"/>
+          <a:ext cx="0" cy="0"/>
+          <a:chOff x="0" y="0"/>
+          <a:chExt cx="0" cy="0"/>
+        </a:xfrm>
+      </p:grpSpPr>
+      <p:grpSp>
+        <p:nvGrpSpPr>
+          <p:cNvPr id="12" name="Group 11">
+            <a:extLst>
+              <a:ext uri="{FF2B5EF4-FFF2-40B4-BE49-F238E27FC236}">
+                <a16:creationId xmlns:a16="http://schemas.microsoft.com/office/drawing/2014/main" id="{6A7A7A8B-49CD-EE4B-9A6B-0DFA26797124}"/>
+              </a:ext>
+            </a:extLst>
+          </p:cNvPr>
+          <p:cNvGrpSpPr/>
+          <p:nvPr/>
+        </p:nvGrpSpPr>
+        <p:grpSpPr>
+          <a:xfrm>
+            <a:off x="1258703" y="2450813"/>
+            <a:ext cx="9330333" cy="1249095"/>
+            <a:chOff x="1258701" y="2450811"/>
+            <a:chExt cx="9330333" cy="1249095"/>
+          </a:xfrm>
+        </p:grpSpPr>
+        <p:pic>
+          <p:nvPicPr>
+            <p:cNvPr id="3" name="Picture 2" descr="A picture containing close&#10;&#10;Description automatically generated">
+              <a:extLst>
+                <a:ext uri="{FF2B5EF4-FFF2-40B4-BE49-F238E27FC236}">
+                  <a16:creationId xmlns:a16="http://schemas.microsoft.com/office/drawing/2014/main" id="{4688688F-931A-DF4E-A385-FFC1999C7F7C}"/>
+                </a:ext>
+              </a:extLst>
+            </p:cNvPr>
+            <p:cNvPicPr>
+              <a:picLocks noChangeAspect="1"/>
+            </p:cNvPicPr>
+            <p:nvPr/>
+          </p:nvPicPr>
+          <p:blipFill>
+            <a:blip r:embed="rId2"/>
+            <a:stretch>
+              <a:fillRect/>
+            </a:stretch>
+          </p:blipFill>
+          <p:spPr>
+            <a:xfrm>
+              <a:off x="5310090" y="2450811"/>
+              <a:ext cx="1227558" cy="1249095"/>
+            </a:xfrm>
+            <a:prstGeom prst="ellipse">
+              <a:avLst/>
+            </a:prstGeom>
+          </p:spPr>
+        </p:pic>
+        <p:pic>
+          <p:nvPicPr>
+            <p:cNvPr id="4" name="Picture 3">
+              <a:extLst>
+                <a:ext uri="{FF2B5EF4-FFF2-40B4-BE49-F238E27FC236}">
+                  <a16:creationId xmlns:a16="http://schemas.microsoft.com/office/drawing/2014/main" id="{C44D1F24-D870-0C44-9D76-DD267D37CF47}"/>
+                </a:ext>
+              </a:extLst>
+            </p:cNvPr>
+            <p:cNvPicPr>
+              <a:picLocks noChangeAspect="1"/>
+            </p:cNvPicPr>
+            <p:nvPr/>
+          </p:nvPicPr>
+          <p:blipFill>
+            <a:blip r:embed="rId3"/>
+            <a:stretch>
+              <a:fillRect/>
+            </a:stretch>
+          </p:blipFill>
+          <p:spPr>
+            <a:xfrm>
+              <a:off x="3959627" y="2450811"/>
+              <a:ext cx="1227558" cy="1249095"/>
+            </a:xfrm>
+            <a:prstGeom prst="ellipse">
+              <a:avLst/>
+            </a:prstGeom>
+          </p:spPr>
+        </p:pic>
+        <p:pic>
+          <p:nvPicPr>
+            <p:cNvPr id="5" name="Picture 4" descr="A picture containing indoor&#10;&#10;Description automatically generated">
+              <a:extLst>
+                <a:ext uri="{FF2B5EF4-FFF2-40B4-BE49-F238E27FC236}">
+                  <a16:creationId xmlns:a16="http://schemas.microsoft.com/office/drawing/2014/main" id="{D7B4FB6E-ED54-454F-BE64-C3627AE94753}"/>
+                </a:ext>
+              </a:extLst>
+            </p:cNvPr>
+            <p:cNvPicPr>
+              <a:picLocks noChangeAspect="1"/>
+            </p:cNvPicPr>
+            <p:nvPr/>
+          </p:nvPicPr>
+          <p:blipFill>
+            <a:blip r:embed="rId4"/>
+            <a:stretch>
+              <a:fillRect/>
+            </a:stretch>
+          </p:blipFill>
+          <p:spPr>
+            <a:xfrm>
+              <a:off x="2609164" y="2450811"/>
+              <a:ext cx="1227558" cy="1249095"/>
+            </a:xfrm>
+            <a:prstGeom prst="ellipse">
+              <a:avLst/>
+            </a:prstGeom>
+          </p:spPr>
+        </p:pic>
+        <p:pic>
+          <p:nvPicPr>
+            <p:cNvPr id="6" name="Picture 5" descr="A picture containing indoor&#10;&#10;Description automatically generated">
+              <a:extLst>
+                <a:ext uri="{FF2B5EF4-FFF2-40B4-BE49-F238E27FC236}">
+                  <a16:creationId xmlns:a16="http://schemas.microsoft.com/office/drawing/2014/main" id="{558E4C2E-8B95-7740-A8A3-69B884BA5968}"/>
+                </a:ext>
+              </a:extLst>
+            </p:cNvPr>
+            <p:cNvPicPr>
+              <a:picLocks noChangeAspect="1"/>
+            </p:cNvPicPr>
+            <p:nvPr/>
+          </p:nvPicPr>
+          <p:blipFill>
+            <a:blip r:embed="rId5"/>
+            <a:stretch>
+              <a:fillRect/>
+            </a:stretch>
+          </p:blipFill>
+          <p:spPr>
+            <a:xfrm>
+              <a:off x="6660553" y="2450811"/>
+              <a:ext cx="1227558" cy="1249095"/>
+            </a:xfrm>
+            <a:prstGeom prst="ellipse">
+              <a:avLst/>
+            </a:prstGeom>
+          </p:spPr>
+        </p:pic>
+        <p:pic>
+          <p:nvPicPr>
+            <p:cNvPr id="7" name="Picture 6" descr="A picture containing indoor, cup, invertebrate&#10;&#10;Description automatically generated">
+              <a:extLst>
+                <a:ext uri="{FF2B5EF4-FFF2-40B4-BE49-F238E27FC236}">
+                  <a16:creationId xmlns:a16="http://schemas.microsoft.com/office/drawing/2014/main" id="{79530101-D19D-8341-B17B-592640010B7A}"/>
+                </a:ext>
+              </a:extLst>
+            </p:cNvPr>
+            <p:cNvPicPr>
+              <a:picLocks noChangeAspect="1"/>
+            </p:cNvPicPr>
+            <p:nvPr/>
+          </p:nvPicPr>
+          <p:blipFill>
+            <a:blip r:embed="rId6"/>
+            <a:stretch>
+              <a:fillRect/>
+            </a:stretch>
+          </p:blipFill>
+          <p:spPr>
+            <a:xfrm>
+              <a:off x="1258701" y="2450811"/>
+              <a:ext cx="1227558" cy="1249095"/>
+            </a:xfrm>
+            <a:prstGeom prst="ellipse">
+              <a:avLst/>
+            </a:prstGeom>
+          </p:spPr>
+        </p:pic>
+        <p:pic>
+          <p:nvPicPr>
+            <p:cNvPr id="8" name="Picture 7">
+              <a:extLst>
+                <a:ext uri="{FF2B5EF4-FFF2-40B4-BE49-F238E27FC236}">
+                  <a16:creationId xmlns:a16="http://schemas.microsoft.com/office/drawing/2014/main" id="{35ECE168-F02E-B846-B177-8C3E3F019D7F}"/>
+                </a:ext>
+              </a:extLst>
+            </p:cNvPr>
+            <p:cNvPicPr>
+              <a:picLocks noChangeAspect="1"/>
+            </p:cNvPicPr>
+            <p:nvPr/>
+          </p:nvPicPr>
+          <p:blipFill rotWithShape="1">
+            <a:blip r:embed="rId7" cstate="print">
+              <a:extLst>
+                <a:ext uri="{28A0092B-C50C-407E-A947-70E740481C1C}">
+                  <a14:useLocalDpi xmlns:a14="http://schemas.microsoft.com/office/drawing/2010/main" val="0"/>
+                </a:ext>
+              </a:extLst>
+            </a:blip>
+            <a:srcRect t="7845"/>
+            <a:stretch/>
+          </p:blipFill>
+          <p:spPr>
+            <a:xfrm>
+              <a:off x="9361476" y="2450811"/>
+              <a:ext cx="1227558" cy="1249095"/>
+            </a:xfrm>
+            <a:prstGeom prst="ellipse">
+              <a:avLst/>
+            </a:prstGeom>
+          </p:spPr>
+        </p:pic>
+        <p:pic>
+          <p:nvPicPr>
+            <p:cNvPr id="9" name="Picture 8">
+              <a:extLst>
+                <a:ext uri="{FF2B5EF4-FFF2-40B4-BE49-F238E27FC236}">
+                  <a16:creationId xmlns:a16="http://schemas.microsoft.com/office/drawing/2014/main" id="{9F571BA3-5ABE-B24E-9E90-0545E028C370}"/>
+                </a:ext>
+              </a:extLst>
+            </p:cNvPr>
+            <p:cNvPicPr>
+              <a:picLocks noChangeAspect="1"/>
+            </p:cNvPicPr>
+            <p:nvPr/>
+          </p:nvPicPr>
+          <p:blipFill rotWithShape="1">
+            <a:blip r:embed="rId8" cstate="print">
+              <a:extLst>
+                <a:ext uri="{28A0092B-C50C-407E-A947-70E740481C1C}">
+                  <a14:useLocalDpi xmlns:a14="http://schemas.microsoft.com/office/drawing/2010/main" val="0"/>
+                </a:ext>
+              </a:extLst>
+            </a:blip>
+            <a:srcRect b="6968"/>
+            <a:stretch/>
+          </p:blipFill>
+          <p:spPr>
+            <a:xfrm>
+              <a:off x="8011016" y="2450811"/>
+              <a:ext cx="1227558" cy="1249095"/>
+            </a:xfrm>
+            <a:prstGeom prst="ellipse">
+              <a:avLst/>
+            </a:prstGeom>
+          </p:spPr>
+        </p:pic>
+      </p:grpSp>
+    </p:spTree>
+    <p:extLst>
+      <p:ext uri="{BB962C8B-B14F-4D97-AF65-F5344CB8AC3E}">
+        <p14:creationId xmlns:p14="http://schemas.microsoft.com/office/powerpoint/2010/main" val="1185300235"/>
+      </p:ext>
+    </p:extLst>
+  </p:cSld>
+  <p:clrMapOvr>
+    <a:masterClrMapping/>
+  </p:clrMapOvr>
+</p:sld>
+</file>
+
+<file path=ppt/slides/slide4.xml><?xml version="1.0" encoding="utf-8"?>
+<p:sld xmlns:a="http://schemas.openxmlformats.org/drawingml/2006/main" xmlns:r="http://schemas.openxmlformats.org/officeDocument/2006/relationships" xmlns:p="http://schemas.openxmlformats.org/presentationml/2006/main">
+  <p:cSld>
+    <p:spTree>
+      <p:nvGrpSpPr>
+        <p:cNvPr id="1" name=""/>
+        <p:cNvGrpSpPr/>
+        <p:nvPr/>
+      </p:nvGrpSpPr>
+      <p:grpSpPr>
+        <a:xfrm>
+          <a:off x="0" y="0"/>
+          <a:ext cx="0" cy="0"/>
+          <a:chOff x="0" y="0"/>
+          <a:chExt cx="0" cy="0"/>
+        </a:xfrm>
+      </p:grpSpPr>
+      <p:grpSp>
+        <p:nvGrpSpPr>
+          <p:cNvPr id="21" name="Group 20">
+            <a:extLst>
+              <a:ext uri="{FF2B5EF4-FFF2-40B4-BE49-F238E27FC236}">
+                <a16:creationId xmlns:a16="http://schemas.microsoft.com/office/drawing/2014/main" id="{739F24A8-877B-C545-BBDA-23B5BFF8D867}"/>
+              </a:ext>
+            </a:extLst>
+          </p:cNvPr>
+          <p:cNvGrpSpPr/>
+          <p:nvPr/>
+        </p:nvGrpSpPr>
+        <p:grpSpPr>
+          <a:xfrm>
+            <a:off x="113231" y="3076459"/>
+            <a:ext cx="12061108" cy="705788"/>
+            <a:chOff x="113231" y="3076459"/>
+            <a:chExt cx="12061108" cy="705788"/>
+          </a:xfrm>
+        </p:grpSpPr>
+        <p:pic>
+          <p:nvPicPr>
+            <p:cNvPr id="3" name="Picture 2" descr="A picture containing close&#10;&#10;Description automatically generated">
+              <a:extLst>
+                <a:ext uri="{FF2B5EF4-FFF2-40B4-BE49-F238E27FC236}">
+                  <a16:creationId xmlns:a16="http://schemas.microsoft.com/office/drawing/2014/main" id="{FD51A105-F6C0-5046-92A9-F26D00EF7CA6}"/>
+                </a:ext>
+              </a:extLst>
+            </p:cNvPr>
+            <p:cNvPicPr>
+              <a:picLocks noChangeAspect="1"/>
+            </p:cNvPicPr>
+            <p:nvPr/>
+          </p:nvPicPr>
+          <p:blipFill>
+            <a:blip r:embed="rId2"/>
+            <a:stretch>
+              <a:fillRect/>
+            </a:stretch>
+          </p:blipFill>
+          <p:spPr>
+            <a:xfrm>
+              <a:off x="2386520" y="3076459"/>
+              <a:ext cx="692926" cy="705082"/>
+            </a:xfrm>
+            <a:prstGeom prst="ellipse">
+              <a:avLst/>
+            </a:prstGeom>
+          </p:spPr>
+        </p:pic>
+        <p:pic>
+          <p:nvPicPr>
+            <p:cNvPr id="4" name="Picture 3">
+              <a:extLst>
+                <a:ext uri="{FF2B5EF4-FFF2-40B4-BE49-F238E27FC236}">
+                  <a16:creationId xmlns:a16="http://schemas.microsoft.com/office/drawing/2014/main" id="{104A6511-F528-664A-86AC-EF70EED58E69}"/>
+                </a:ext>
+              </a:extLst>
+            </p:cNvPr>
+            <p:cNvPicPr>
+              <a:picLocks noChangeAspect="1"/>
+            </p:cNvPicPr>
+            <p:nvPr/>
+          </p:nvPicPr>
+          <p:blipFill>
+            <a:blip r:embed="rId3"/>
+            <a:stretch>
+              <a:fillRect/>
+            </a:stretch>
+          </p:blipFill>
+          <p:spPr>
+            <a:xfrm>
+              <a:off x="6176508" y="3076459"/>
+              <a:ext cx="692926" cy="705082"/>
+            </a:xfrm>
+            <a:prstGeom prst="ellipse">
+              <a:avLst/>
+            </a:prstGeom>
+          </p:spPr>
+        </p:pic>
+        <p:pic>
+          <p:nvPicPr>
+            <p:cNvPr id="5" name="Picture 4" descr="A picture containing indoor&#10;&#10;Description automatically generated">
+              <a:extLst>
+                <a:ext uri="{FF2B5EF4-FFF2-40B4-BE49-F238E27FC236}">
+                  <a16:creationId xmlns:a16="http://schemas.microsoft.com/office/drawing/2014/main" id="{404F47C1-37A2-3A47-8E71-772C66C7E11A}"/>
+                </a:ext>
+              </a:extLst>
+            </p:cNvPr>
+            <p:cNvPicPr>
+              <a:picLocks noChangeAspect="1"/>
+            </p:cNvPicPr>
+            <p:nvPr/>
+          </p:nvPicPr>
+          <p:blipFill>
+            <a:blip r:embed="rId4"/>
+            <a:stretch>
+              <a:fillRect/>
+            </a:stretch>
+          </p:blipFill>
+          <p:spPr>
+            <a:xfrm>
+              <a:off x="4660982" y="3076459"/>
+              <a:ext cx="692926" cy="705082"/>
+            </a:xfrm>
+            <a:prstGeom prst="ellipse">
+              <a:avLst/>
+            </a:prstGeom>
+          </p:spPr>
+        </p:pic>
+        <p:pic>
+          <p:nvPicPr>
+            <p:cNvPr id="6" name="Picture 5" descr="A picture containing indoor&#10;&#10;Description automatically generated">
+              <a:extLst>
+                <a:ext uri="{FF2B5EF4-FFF2-40B4-BE49-F238E27FC236}">
+                  <a16:creationId xmlns:a16="http://schemas.microsoft.com/office/drawing/2014/main" id="{FFDE5A73-30AD-114E-AE6F-E88F071736A3}"/>
+                </a:ext>
+              </a:extLst>
+            </p:cNvPr>
+            <p:cNvPicPr>
+              <a:picLocks noChangeAspect="1"/>
+            </p:cNvPicPr>
+            <p:nvPr/>
+          </p:nvPicPr>
+          <p:blipFill>
+            <a:blip r:embed="rId5"/>
+            <a:stretch>
+              <a:fillRect/>
+            </a:stretch>
+          </p:blipFill>
+          <p:spPr>
+            <a:xfrm>
+              <a:off x="1628757" y="3076459"/>
+              <a:ext cx="692926" cy="705082"/>
+            </a:xfrm>
+            <a:prstGeom prst="ellipse">
+              <a:avLst/>
+            </a:prstGeom>
+          </p:spPr>
+        </p:pic>
+        <p:pic>
+          <p:nvPicPr>
+            <p:cNvPr id="7" name="Picture 6" descr="A picture containing indoor, cup, invertebrate&#10;&#10;Description automatically generated">
+              <a:extLst>
+                <a:ext uri="{FF2B5EF4-FFF2-40B4-BE49-F238E27FC236}">
+                  <a16:creationId xmlns:a16="http://schemas.microsoft.com/office/drawing/2014/main" id="{ECF4D4C6-58E9-F546-B771-8BA125D3DC97}"/>
+                </a:ext>
+              </a:extLst>
+            </p:cNvPr>
+            <p:cNvPicPr>
+              <a:picLocks noChangeAspect="1"/>
+            </p:cNvPicPr>
+            <p:nvPr/>
+          </p:nvPicPr>
+          <p:blipFill>
+            <a:blip r:embed="rId6"/>
+            <a:stretch>
+              <a:fillRect/>
+            </a:stretch>
+          </p:blipFill>
+          <p:spPr>
+            <a:xfrm>
+              <a:off x="113231" y="3076459"/>
+              <a:ext cx="692926" cy="705082"/>
+            </a:xfrm>
+            <a:prstGeom prst="ellipse">
+              <a:avLst/>
+            </a:prstGeom>
+          </p:spPr>
+        </p:pic>
+        <p:pic>
+          <p:nvPicPr>
+            <p:cNvPr id="8" name="Picture 7">
+              <a:extLst>
+                <a:ext uri="{FF2B5EF4-FFF2-40B4-BE49-F238E27FC236}">
+                  <a16:creationId xmlns:a16="http://schemas.microsoft.com/office/drawing/2014/main" id="{C587A1E6-E817-A54A-8E82-6B14A5D98D4E}"/>
+                </a:ext>
+              </a:extLst>
+            </p:cNvPr>
+            <p:cNvPicPr>
+              <a:picLocks noChangeAspect="1"/>
+            </p:cNvPicPr>
+            <p:nvPr/>
+          </p:nvPicPr>
+          <p:blipFill rotWithShape="1">
+            <a:blip r:embed="rId7" cstate="print">
+              <a:extLst>
+                <a:ext uri="{28A0092B-C50C-407E-A947-70E740481C1C}">
+                  <a14:useLocalDpi xmlns:a14="http://schemas.microsoft.com/office/drawing/2010/main" val="0"/>
+                </a:ext>
+              </a:extLst>
+            </a:blip>
+            <a:srcRect t="7845"/>
+            <a:stretch/>
+          </p:blipFill>
+          <p:spPr>
+            <a:xfrm>
+              <a:off x="3144283" y="3076459"/>
+              <a:ext cx="692926" cy="705082"/>
+            </a:xfrm>
+            <a:prstGeom prst="ellipse">
+              <a:avLst/>
+            </a:prstGeom>
+          </p:spPr>
+        </p:pic>
+        <p:pic>
+          <p:nvPicPr>
+            <p:cNvPr id="9" name="Picture 8">
+              <a:extLst>
+                <a:ext uri="{FF2B5EF4-FFF2-40B4-BE49-F238E27FC236}">
+                  <a16:creationId xmlns:a16="http://schemas.microsoft.com/office/drawing/2014/main" id="{D1A0C150-D149-EA46-A6F9-C87392711AD7}"/>
+                </a:ext>
+              </a:extLst>
+            </p:cNvPr>
+            <p:cNvPicPr>
+              <a:picLocks noChangeAspect="1"/>
+            </p:cNvPicPr>
+            <p:nvPr/>
+          </p:nvPicPr>
+          <p:blipFill rotWithShape="1">
+            <a:blip r:embed="rId8" cstate="print">
+              <a:extLst>
+                <a:ext uri="{28A0092B-C50C-407E-A947-70E740481C1C}">
+                  <a14:useLocalDpi xmlns:a14="http://schemas.microsoft.com/office/drawing/2010/main" val="0"/>
+                </a:ext>
+              </a:extLst>
+            </a:blip>
+            <a:srcRect b="6968"/>
+            <a:stretch/>
+          </p:blipFill>
+          <p:spPr>
+            <a:xfrm>
+              <a:off x="870994" y="3076459"/>
+              <a:ext cx="692926" cy="705082"/>
+            </a:xfrm>
+            <a:prstGeom prst="ellipse">
+              <a:avLst/>
+            </a:prstGeom>
+          </p:spPr>
+        </p:pic>
+        <p:pic>
+          <p:nvPicPr>
+            <p:cNvPr id="10" name="Picture 9">
+              <a:extLst>
+                <a:ext uri="{FF2B5EF4-FFF2-40B4-BE49-F238E27FC236}">
+                  <a16:creationId xmlns:a16="http://schemas.microsoft.com/office/drawing/2014/main" id="{775AE238-5D19-E048-BEBA-53E90A8C339F}"/>
+                </a:ext>
+              </a:extLst>
+            </p:cNvPr>
+            <p:cNvPicPr>
+              <a:picLocks noChangeAspect="1"/>
+            </p:cNvPicPr>
+            <p:nvPr/>
+          </p:nvPicPr>
+          <p:blipFill rotWithShape="1">
+            <a:blip r:embed="rId9" cstate="print">
+              <a:extLst>
+                <a:ext uri="{28A0092B-C50C-407E-A947-70E740481C1C}">
+                  <a14:useLocalDpi xmlns:a14="http://schemas.microsoft.com/office/drawing/2010/main" val="0"/>
+                </a:ext>
+              </a:extLst>
+            </a:blip>
+            <a:srcRect t="4029" b="4540"/>
+            <a:stretch/>
+          </p:blipFill>
+          <p:spPr>
+            <a:xfrm>
+              <a:off x="6934271" y="3076459"/>
+              <a:ext cx="692926" cy="705082"/>
+            </a:xfrm>
+            <a:prstGeom prst="ellipse">
+              <a:avLst/>
+            </a:prstGeom>
+          </p:spPr>
+        </p:pic>
+        <p:pic>
+          <p:nvPicPr>
+            <p:cNvPr id="11" name="Picture 10">
+              <a:extLst>
+                <a:ext uri="{FF2B5EF4-FFF2-40B4-BE49-F238E27FC236}">
+                  <a16:creationId xmlns:a16="http://schemas.microsoft.com/office/drawing/2014/main" id="{95A0C4AE-4FDD-0F4F-B419-5810CD25F744}"/>
+                </a:ext>
+              </a:extLst>
+            </p:cNvPr>
+            <p:cNvPicPr>
+              <a:picLocks noChangeAspect="1"/>
+            </p:cNvPicPr>
+            <p:nvPr/>
+          </p:nvPicPr>
+          <p:blipFill rotWithShape="1">
+            <a:blip r:embed="rId10" cstate="print">
+              <a:extLst>
+                <a:ext uri="{28A0092B-C50C-407E-A947-70E740481C1C}">
+                  <a14:useLocalDpi xmlns:a14="http://schemas.microsoft.com/office/drawing/2010/main" val="0"/>
+                </a:ext>
+              </a:extLst>
+            </a:blip>
+            <a:srcRect l="5993" r="4442"/>
+            <a:stretch/>
+          </p:blipFill>
+          <p:spPr>
+            <a:xfrm>
+              <a:off x="5418745" y="3076459"/>
+              <a:ext cx="692926" cy="705082"/>
+            </a:xfrm>
+            <a:prstGeom prst="ellipse">
+              <a:avLst/>
+            </a:prstGeom>
+          </p:spPr>
+        </p:pic>
+        <p:pic>
+          <p:nvPicPr>
+            <p:cNvPr id="12" name="Picture 11">
+              <a:extLst>
+                <a:ext uri="{FF2B5EF4-FFF2-40B4-BE49-F238E27FC236}">
+                  <a16:creationId xmlns:a16="http://schemas.microsoft.com/office/drawing/2014/main" id="{DD2AC2C0-41C7-8C4D-A47C-A612597E5C81}"/>
+                </a:ext>
+              </a:extLst>
+            </p:cNvPr>
+            <p:cNvPicPr>
+              <a:picLocks noChangeAspect="1"/>
+            </p:cNvPicPr>
+            <p:nvPr/>
+          </p:nvPicPr>
+          <p:blipFill rotWithShape="1">
+            <a:blip r:embed="rId11" cstate="print">
+              <a:extLst>
+                <a:ext uri="{28A0092B-C50C-407E-A947-70E740481C1C}">
+                  <a14:useLocalDpi xmlns:a14="http://schemas.microsoft.com/office/drawing/2010/main" val="0"/>
+                </a:ext>
+              </a:extLst>
+            </a:blip>
+            <a:srcRect l="2319" r="4935"/>
+            <a:stretch/>
+          </p:blipFill>
+          <p:spPr>
+            <a:xfrm>
+              <a:off x="3902046" y="3076459"/>
+              <a:ext cx="694099" cy="705788"/>
+            </a:xfrm>
+            <a:prstGeom prst="ellipse">
+              <a:avLst/>
+            </a:prstGeom>
+          </p:spPr>
+        </p:pic>
+        <p:pic>
+          <p:nvPicPr>
+            <p:cNvPr id="13" name="Picture 12">
+              <a:extLst>
+                <a:ext uri="{FF2B5EF4-FFF2-40B4-BE49-F238E27FC236}">
+                  <a16:creationId xmlns:a16="http://schemas.microsoft.com/office/drawing/2014/main" id="{EA365E1A-D580-5D44-B5C3-0C257414070A}"/>
+                </a:ext>
+              </a:extLst>
+            </p:cNvPr>
+            <p:cNvPicPr>
+              <a:picLocks noChangeAspect="1"/>
+            </p:cNvPicPr>
+            <p:nvPr/>
+          </p:nvPicPr>
+          <p:blipFill rotWithShape="1">
+            <a:blip r:embed="rId12" cstate="print">
+              <a:extLst>
+                <a:ext uri="{28A0092B-C50C-407E-A947-70E740481C1C}">
+                  <a14:useLocalDpi xmlns:a14="http://schemas.microsoft.com/office/drawing/2010/main" val="0"/>
+                </a:ext>
+              </a:extLst>
+            </a:blip>
+            <a:srcRect l="57542" t="18407" r="19711" b="52633"/>
+            <a:stretch/>
+          </p:blipFill>
+          <p:spPr>
+            <a:xfrm>
+              <a:off x="8450366" y="3076459"/>
+              <a:ext cx="692926" cy="705788"/>
+            </a:xfrm>
+            <a:prstGeom prst="ellipse">
+              <a:avLst/>
+            </a:prstGeom>
+          </p:spPr>
+        </p:pic>
+        <p:pic>
+          <p:nvPicPr>
+            <p:cNvPr id="14" name="Picture 13">
+              <a:extLst>
+                <a:ext uri="{FF2B5EF4-FFF2-40B4-BE49-F238E27FC236}">
+                  <a16:creationId xmlns:a16="http://schemas.microsoft.com/office/drawing/2014/main" id="{F9D34353-9292-5C45-B48C-893325123E2B}"/>
+                </a:ext>
+              </a:extLst>
+            </p:cNvPr>
+            <p:cNvPicPr>
+              <a:picLocks noChangeAspect="1"/>
+            </p:cNvPicPr>
+            <p:nvPr/>
+          </p:nvPicPr>
+          <p:blipFill rotWithShape="1">
+            <a:blip r:embed="rId13" cstate="print">
+              <a:extLst>
+                <a:ext uri="{28A0092B-C50C-407E-A947-70E740481C1C}">
+                  <a14:useLocalDpi xmlns:a14="http://schemas.microsoft.com/office/drawing/2010/main" val="0"/>
+                </a:ext>
+              </a:extLst>
+            </a:blip>
+            <a:srcRect l="850" r="4483"/>
+            <a:stretch/>
+          </p:blipFill>
+          <p:spPr>
+            <a:xfrm>
+              <a:off x="9208129" y="3076459"/>
+              <a:ext cx="692926" cy="705082"/>
+            </a:xfrm>
+            <a:prstGeom prst="ellipse">
+              <a:avLst/>
+            </a:prstGeom>
+          </p:spPr>
+        </p:pic>
+        <p:pic>
+          <p:nvPicPr>
+            <p:cNvPr id="15" name="Picture 14">
+              <a:extLst>
+                <a:ext uri="{FF2B5EF4-FFF2-40B4-BE49-F238E27FC236}">
+                  <a16:creationId xmlns:a16="http://schemas.microsoft.com/office/drawing/2014/main" id="{90A1E258-4BC6-A842-A761-3432923E950E}"/>
+                </a:ext>
+              </a:extLst>
+            </p:cNvPr>
+            <p:cNvPicPr>
+              <a:picLocks noChangeAspect="1"/>
+            </p:cNvPicPr>
+            <p:nvPr/>
+          </p:nvPicPr>
+          <p:blipFill rotWithShape="1">
+            <a:blip r:embed="rId14" cstate="print">
+              <a:extLst>
+                <a:ext uri="{28A0092B-C50C-407E-A947-70E740481C1C}">
+                  <a14:useLocalDpi xmlns:a14="http://schemas.microsoft.com/office/drawing/2010/main" val="0"/>
+                </a:ext>
+              </a:extLst>
+            </a:blip>
+            <a:srcRect l="9999" r="14087"/>
+            <a:stretch/>
+          </p:blipFill>
+          <p:spPr>
+            <a:xfrm>
+              <a:off x="11481413" y="3076459"/>
+              <a:ext cx="692926" cy="705788"/>
+            </a:xfrm>
+            <a:prstGeom prst="ellipse">
+              <a:avLst/>
+            </a:prstGeom>
+          </p:spPr>
+        </p:pic>
+        <p:pic>
+          <p:nvPicPr>
+            <p:cNvPr id="16" name="Picture 15">
+              <a:extLst>
+                <a:ext uri="{FF2B5EF4-FFF2-40B4-BE49-F238E27FC236}">
+                  <a16:creationId xmlns:a16="http://schemas.microsoft.com/office/drawing/2014/main" id="{02518D75-B328-2246-A863-349FA162350D}"/>
+                </a:ext>
+              </a:extLst>
+            </p:cNvPr>
+            <p:cNvPicPr>
+              <a:picLocks noChangeAspect="1"/>
+            </p:cNvPicPr>
+            <p:nvPr/>
+          </p:nvPicPr>
+          <p:blipFill rotWithShape="1">
+            <a:blip r:embed="rId15" cstate="print">
+              <a:extLst>
+                <a:ext uri="{28A0092B-C50C-407E-A947-70E740481C1C}">
+                  <a14:useLocalDpi xmlns:a14="http://schemas.microsoft.com/office/drawing/2010/main" val="0"/>
+                </a:ext>
+              </a:extLst>
+            </a:blip>
+            <a:srcRect l="7058"/>
+            <a:stretch/>
+          </p:blipFill>
+          <p:spPr>
+            <a:xfrm>
+              <a:off x="9965892" y="3076459"/>
+              <a:ext cx="692926" cy="705788"/>
+            </a:xfrm>
+            <a:prstGeom prst="ellipse">
+              <a:avLst/>
+            </a:prstGeom>
+          </p:spPr>
+        </p:pic>
+        <p:pic>
+          <p:nvPicPr>
+            <p:cNvPr id="17" name="Picture 16">
+              <a:extLst>
+                <a:ext uri="{FF2B5EF4-FFF2-40B4-BE49-F238E27FC236}">
+                  <a16:creationId xmlns:a16="http://schemas.microsoft.com/office/drawing/2014/main" id="{F27723F8-D44F-984A-A004-0DDEA8621AD1}"/>
+                </a:ext>
+              </a:extLst>
+            </p:cNvPr>
+            <p:cNvPicPr>
+              <a:picLocks noChangeAspect="1"/>
+            </p:cNvPicPr>
+            <p:nvPr/>
+          </p:nvPicPr>
+          <p:blipFill rotWithShape="1">
+            <a:blip r:embed="rId16" cstate="print">
+              <a:extLst>
+                <a:ext uri="{28A0092B-C50C-407E-A947-70E740481C1C}">
+                  <a14:useLocalDpi xmlns:a14="http://schemas.microsoft.com/office/drawing/2010/main" val="0"/>
+                </a:ext>
+              </a:extLst>
+            </a:blip>
+            <a:srcRect l="6778" r="4220"/>
+            <a:stretch/>
+          </p:blipFill>
+          <p:spPr>
+            <a:xfrm>
+              <a:off x="10723655" y="3076459"/>
+              <a:ext cx="692926" cy="705788"/>
+            </a:xfrm>
+            <a:prstGeom prst="ellipse">
+              <a:avLst/>
+            </a:prstGeom>
+          </p:spPr>
+        </p:pic>
+        <p:pic>
+          <p:nvPicPr>
+            <p:cNvPr id="18" name="Picture 17">
+              <a:extLst>
+                <a:ext uri="{FF2B5EF4-FFF2-40B4-BE49-F238E27FC236}">
+                  <a16:creationId xmlns:a16="http://schemas.microsoft.com/office/drawing/2014/main" id="{1228DF71-3123-5F44-9B2D-3CF16FB76CE6}"/>
+                </a:ext>
+              </a:extLst>
+            </p:cNvPr>
+            <p:cNvPicPr>
+              <a:picLocks noChangeAspect="1"/>
+            </p:cNvPicPr>
+            <p:nvPr/>
+          </p:nvPicPr>
+          <p:blipFill rotWithShape="1">
+            <a:blip r:embed="rId17" cstate="print">
+              <a:extLst>
+                <a:ext uri="{28A0092B-C50C-407E-A947-70E740481C1C}">
+                  <a14:useLocalDpi xmlns:a14="http://schemas.microsoft.com/office/drawing/2010/main" val="0"/>
+                </a:ext>
+              </a:extLst>
+            </a:blip>
+            <a:srcRect l="5212" r="1472"/>
+            <a:stretch/>
+          </p:blipFill>
+          <p:spPr>
+            <a:xfrm>
+              <a:off x="7692034" y="3076459"/>
+              <a:ext cx="693495" cy="705788"/>
+            </a:xfrm>
+            <a:prstGeom prst="ellipse">
+              <a:avLst/>
+            </a:prstGeom>
+          </p:spPr>
+        </p:pic>
+      </p:grpSp>
+    </p:spTree>
+    <p:extLst>
+      <p:ext uri="{BB962C8B-B14F-4D97-AF65-F5344CB8AC3E}">
+        <p14:creationId xmlns:p14="http://schemas.microsoft.com/office/powerpoint/2010/main" val="1615538024"/>
+      </p:ext>
+    </p:extLst>
+  </p:cSld>
+  <p:clrMapOvr>
+    <a:masterClrMapping/>
+  </p:clrMapOvr>
+</p:sld>
+</file>
+
+<file path=ppt/slides/slide5.xml><?xml version="1.0" encoding="utf-8"?>
+<p:sld xmlns:a="http://schemas.openxmlformats.org/drawingml/2006/main" xmlns:r="http://schemas.openxmlformats.org/officeDocument/2006/relationships" xmlns:p="http://schemas.openxmlformats.org/presentationml/2006/main">
+  <p:cSld>
+    <p:spTree>
+      <p:nvGrpSpPr>
+        <p:cNvPr id="1" name=""/>
+        <p:cNvGrpSpPr/>
+        <p:nvPr/>
+      </p:nvGrpSpPr>
+      <p:grpSpPr>
+        <a:xfrm>
+          <a:off x="0" y="0"/>
+          <a:ext cx="0" cy="0"/>
+          <a:chOff x="0" y="0"/>
+          <a:chExt cx="0" cy="0"/>
+        </a:xfrm>
+      </p:grpSpPr>
+      <p:grpSp>
+        <p:nvGrpSpPr>
+          <p:cNvPr id="15" name="Group 14">
+            <a:extLst>
+              <a:ext uri="{FF2B5EF4-FFF2-40B4-BE49-F238E27FC236}">
+                <a16:creationId xmlns:a16="http://schemas.microsoft.com/office/drawing/2014/main" id="{24FE4E90-F985-E64B-BED5-F49498017A53}"/>
+              </a:ext>
+            </a:extLst>
+          </p:cNvPr>
+          <p:cNvGrpSpPr/>
+          <p:nvPr/>
+        </p:nvGrpSpPr>
+        <p:grpSpPr>
+          <a:xfrm>
+            <a:off x="80674" y="1266194"/>
+            <a:ext cx="12030652" cy="4341740"/>
+            <a:chOff x="40337" y="1270747"/>
+            <a:chExt cx="12030652" cy="4341740"/>
+          </a:xfrm>
+        </p:grpSpPr>
+        <p:sp>
+          <p:nvSpPr>
+            <p:cNvPr id="4" name="Rectangle 3">
+              <a:extLst>
+                <a:ext uri="{FF2B5EF4-FFF2-40B4-BE49-F238E27FC236}">
+                  <a16:creationId xmlns:a16="http://schemas.microsoft.com/office/drawing/2014/main" id="{25A5C847-EF31-FC44-A922-00378DCF2BE4}"/>
+                </a:ext>
+              </a:extLst>
+            </p:cNvPr>
+            <p:cNvSpPr/>
+            <p:nvPr/>
+          </p:nvSpPr>
+          <p:spPr>
+            <a:xfrm>
+              <a:off x="8641989" y="1279853"/>
+              <a:ext cx="3429000" cy="4316506"/>
+            </a:xfrm>
+            <a:prstGeom prst="rect">
+              <a:avLst/>
+            </a:prstGeom>
+            <a:solidFill>
+              <a:srgbClr val="EBF0F1"/>
+            </a:solidFill>
+            <a:ln>
+              <a:noFill/>
+            </a:ln>
+          </p:spPr>
+          <p:style>
+            <a:lnRef idx="2">
+              <a:schemeClr val="accent1">
+                <a:shade val="50000"/>
+              </a:schemeClr>
+            </a:lnRef>
+            <a:fillRef idx="1">
+              <a:schemeClr val="accent1"/>
+            </a:fillRef>
+            <a:effectRef idx="0">
+              <a:schemeClr val="accent1"/>
+            </a:effectRef>
+            <a:fontRef idx="minor">
+              <a:schemeClr val="lt1"/>
+            </a:fontRef>
+          </p:style>
+          <p:txBody>
+            <a:bodyPr rtlCol="0" anchor="t" anchorCtr="0"/>
+            <a:lstStyle/>
+            <a:p>
+              <a:pPr algn="ctr"/>
+              <a:endParaRPr lang="en-US" b="1" dirty="0">
+                <a:solidFill>
+                  <a:srgbClr val="273E52"/>
+                </a:solidFill>
+              </a:endParaRPr>
+            </a:p>
+            <a:p>
+              <a:pPr algn="ctr"/>
+              <a:r>
+                <a:rPr lang="en-US" sz="2200" b="1" dirty="0">
+                  <a:solidFill>
+                    <a:srgbClr val="273E52"/>
+                  </a:solidFill>
+                </a:rPr>
+                <a:t>Download Predictions</a:t>
+              </a:r>
+            </a:p>
+            <a:p>
+              <a:pPr algn="ctr"/>
+              <a:endParaRPr lang="en-US" sz="2000" b="1" dirty="0">
+                <a:solidFill>
+                  <a:srgbClr val="273E52"/>
+                </a:solidFill>
+              </a:endParaRPr>
+            </a:p>
+            <a:p>
+              <a:pPr algn="ctr"/>
+              <a:r>
+                <a:rPr lang="en-US" dirty="0">
+                  <a:solidFill>
+                    <a:srgbClr val="273E52"/>
+                  </a:solidFill>
+                </a:rPr>
+                <a:t>Use the ‘Downloads’ page to download a spreadsheet with the egg characteristics and corresponding predictions.</a:t>
+              </a:r>
+            </a:p>
+          </p:txBody>
+        </p:sp>
+        <p:cxnSp>
+          <p:nvCxnSpPr>
+            <p:cNvPr id="8" name="Straight Arrow Connector 7">
+              <a:extLst>
+                <a:ext uri="{FF2B5EF4-FFF2-40B4-BE49-F238E27FC236}">
+                  <a16:creationId xmlns:a16="http://schemas.microsoft.com/office/drawing/2014/main" id="{A3346050-5CF7-E448-A7E5-350B202ED8AA}"/>
+                </a:ext>
+              </a:extLst>
+            </p:cNvPr>
+            <p:cNvCxnSpPr>
+              <a:cxnSpLocks/>
+              <a:stCxn id="2" idx="3"/>
+              <a:endCxn id="3" idx="1"/>
+            </p:cNvCxnSpPr>
+            <p:nvPr/>
+          </p:nvCxnSpPr>
+          <p:spPr>
+            <a:xfrm>
+              <a:off x="3469337" y="3429000"/>
+              <a:ext cx="871826" cy="25234"/>
+            </a:xfrm>
+            <a:prstGeom prst="straightConnector1">
+              <a:avLst/>
+            </a:prstGeom>
+            <a:ln w="98425">
               <a:solidFill>
                 <a:srgbClr val="273E52"/>
               </a:solidFill>
-            </a:endParaRPr>
-          </a:p>
-          <a:p>
-            <a:pPr algn="ctr"/>
-            <a:r>
-              <a:rPr lang="en-US" sz="2200" b="1" dirty="0">
-                <a:solidFill>
-                  <a:srgbClr val="273E52"/>
-                </a:solidFill>
-              </a:rPr>
-              <a:t>Provide Egg Characteristics</a:t>
-            </a:r>
-          </a:p>
-          <a:p>
-            <a:pPr algn="ctr"/>
-            <a:endParaRPr lang="en-US" sz="2000" b="1" dirty="0">
+              <a:tailEnd type="triangle"/>
+            </a:ln>
+          </p:spPr>
+          <p:style>
+            <a:lnRef idx="1">
+              <a:schemeClr val="accent1"/>
+            </a:lnRef>
+            <a:fillRef idx="0">
+              <a:schemeClr val="accent1"/>
+            </a:fillRef>
+            <a:effectRef idx="0">
+              <a:schemeClr val="accent1"/>
+            </a:effectRef>
+            <a:fontRef idx="minor">
+              <a:schemeClr val="tx1"/>
+            </a:fontRef>
+          </p:style>
+        </p:cxnSp>
+        <p:cxnSp>
+          <p:nvCxnSpPr>
+            <p:cNvPr id="9" name="Straight Arrow Connector 8">
+              <a:extLst>
+                <a:ext uri="{FF2B5EF4-FFF2-40B4-BE49-F238E27FC236}">
+                  <a16:creationId xmlns:a16="http://schemas.microsoft.com/office/drawing/2014/main" id="{3259B603-8A86-B941-9849-F8C01C668F12}"/>
+                </a:ext>
+              </a:extLst>
+            </p:cNvPr>
+            <p:cNvCxnSpPr>
+              <a:cxnSpLocks/>
+              <a:endCxn id="4" idx="1"/>
+            </p:cNvCxnSpPr>
+            <p:nvPr/>
+          </p:nvCxnSpPr>
+          <p:spPr>
+            <a:xfrm>
+              <a:off x="7729828" y="3438106"/>
+              <a:ext cx="912161" cy="0"/>
+            </a:xfrm>
+            <a:prstGeom prst="straightConnector1">
+              <a:avLst/>
+            </a:prstGeom>
+            <a:ln w="98425">
               <a:solidFill>
                 <a:srgbClr val="273E52"/>
               </a:solidFill>
-            </a:endParaRPr>
-          </a:p>
-          <a:p>
-            <a:pPr algn="ctr"/>
-            <a:r>
-              <a:rPr lang="en-US" dirty="0">
-                <a:solidFill>
-                  <a:srgbClr val="273E52"/>
-                </a:solidFill>
-              </a:rPr>
-              <a:t>Use the ‘Data Input’ page to upload a spreadsheet containing characteristics of eggs to obtain predictions</a:t>
-            </a:r>
-          </a:p>
-        </p:txBody>
-      </p:sp>
-      <p:sp>
-        <p:nvSpPr>
-          <p:cNvPr id="3" name="Rectangle 2">
-            <a:extLst>
-              <a:ext uri="{FF2B5EF4-FFF2-40B4-BE49-F238E27FC236}">
-                <a16:creationId xmlns:a16="http://schemas.microsoft.com/office/drawing/2014/main" id="{E2380E1E-09FA-A54B-9942-7536FFD63D3D}"/>
-              </a:ext>
-            </a:extLst>
-          </p:cNvPr>
-          <p:cNvSpPr/>
-          <p:nvPr/>
-        </p:nvSpPr>
-        <p:spPr>
-          <a:xfrm>
-            <a:off x="4381500" y="1270747"/>
-            <a:ext cx="3429000" cy="4316506"/>
-          </a:xfrm>
-          <a:prstGeom prst="rect">
-            <a:avLst/>
-          </a:prstGeom>
-          <a:solidFill>
-            <a:srgbClr val="EBF0F1"/>
-          </a:solidFill>
-          <a:ln>
-            <a:noFill/>
-          </a:ln>
-        </p:spPr>
-        <p:style>
-          <a:lnRef idx="2">
-            <a:schemeClr val="accent1">
-              <a:shade val="50000"/>
-            </a:schemeClr>
-          </a:lnRef>
-          <a:fillRef idx="1">
-            <a:schemeClr val="accent1"/>
-          </a:fillRef>
-          <a:effectRef idx="0">
-            <a:schemeClr val="accent1"/>
-          </a:effectRef>
-          <a:fontRef idx="minor">
-            <a:schemeClr val="lt1"/>
-          </a:fontRef>
-        </p:style>
-        <p:txBody>
-          <a:bodyPr rtlCol="0" anchor="t" anchorCtr="0"/>
-          <a:lstStyle/>
-          <a:p>
-            <a:pPr algn="ctr"/>
-            <a:endParaRPr lang="en-US" dirty="0"/>
-          </a:p>
-          <a:p>
-            <a:pPr algn="ctr"/>
-            <a:r>
-              <a:rPr lang="en-US" sz="2200" b="1" dirty="0">
-                <a:solidFill>
-                  <a:srgbClr val="273E52"/>
-                </a:solidFill>
-              </a:rPr>
-              <a:t>Get Predictions</a:t>
-            </a:r>
-          </a:p>
-          <a:p>
-            <a:pPr algn="ctr"/>
-            <a:endParaRPr lang="en-US" sz="2000" b="1" dirty="0">
+              <a:tailEnd type="triangle"/>
+            </a:ln>
+          </p:spPr>
+          <p:style>
+            <a:lnRef idx="1">
+              <a:schemeClr val="accent1"/>
+            </a:lnRef>
+            <a:fillRef idx="0">
+              <a:schemeClr val="accent1"/>
+            </a:fillRef>
+            <a:effectRef idx="0">
+              <a:schemeClr val="accent1"/>
+            </a:effectRef>
+            <a:fontRef idx="minor">
+              <a:schemeClr val="tx1"/>
+            </a:fontRef>
+          </p:style>
+        </p:cxnSp>
+        <p:grpSp>
+          <p:nvGrpSpPr>
+            <p:cNvPr id="10" name="Group 9">
+              <a:extLst>
+                <a:ext uri="{FF2B5EF4-FFF2-40B4-BE49-F238E27FC236}">
+                  <a16:creationId xmlns:a16="http://schemas.microsoft.com/office/drawing/2014/main" id="{91531773-3385-5343-960C-BC236613FF6B}"/>
+                </a:ext>
+              </a:extLst>
+            </p:cNvPr>
+            <p:cNvGrpSpPr/>
+            <p:nvPr/>
+          </p:nvGrpSpPr>
+          <p:grpSpPr>
+            <a:xfrm>
+              <a:off x="4341163" y="1295981"/>
+              <a:ext cx="3429000" cy="4316506"/>
+              <a:chOff x="4341163" y="1295981"/>
+              <a:chExt cx="3429000" cy="4316506"/>
+            </a:xfrm>
+          </p:grpSpPr>
+          <p:sp>
+            <p:nvSpPr>
+              <p:cNvPr id="3" name="Rectangle 2">
+                <a:extLst>
+                  <a:ext uri="{FF2B5EF4-FFF2-40B4-BE49-F238E27FC236}">
+                    <a16:creationId xmlns:a16="http://schemas.microsoft.com/office/drawing/2014/main" id="{E2380E1E-09FA-A54B-9942-7536FFD63D3D}"/>
+                  </a:ext>
+                </a:extLst>
+              </p:cNvPr>
+              <p:cNvSpPr/>
+              <p:nvPr/>
+            </p:nvSpPr>
+            <p:spPr>
+              <a:xfrm>
+                <a:off x="4341163" y="1295981"/>
+                <a:ext cx="3429000" cy="4316506"/>
+              </a:xfrm>
+              <a:prstGeom prst="rect">
+                <a:avLst/>
+              </a:prstGeom>
               <a:solidFill>
-                <a:srgbClr val="273E52"/>
+                <a:srgbClr val="EBF0F1"/>
               </a:solidFill>
-            </a:endParaRPr>
-          </a:p>
-          <a:p>
-            <a:pPr algn="ctr"/>
-            <a:r>
-              <a:rPr lang="en-US" dirty="0">
-                <a:solidFill>
-                  <a:srgbClr val="273E52"/>
-                </a:solidFill>
-              </a:rPr>
-              <a:t>Use the the ‘Predictions’ page to apply the random forest models to predict the genus, family, and species taxonomies.</a:t>
-            </a:r>
-          </a:p>
-          <a:p>
-            <a:pPr algn="ctr"/>
-            <a:endParaRPr lang="en-US" dirty="0">
+              <a:ln>
+                <a:noFill/>
+              </a:ln>
+            </p:spPr>
+            <p:style>
+              <a:lnRef idx="2">
+                <a:schemeClr val="accent1">
+                  <a:shade val="50000"/>
+                </a:schemeClr>
+              </a:lnRef>
+              <a:fillRef idx="1">
+                <a:schemeClr val="accent1"/>
+              </a:fillRef>
+              <a:effectRef idx="0">
+                <a:schemeClr val="accent1"/>
+              </a:effectRef>
+              <a:fontRef idx="minor">
+                <a:schemeClr val="lt1"/>
+              </a:fontRef>
+            </p:style>
+            <p:txBody>
+              <a:bodyPr rtlCol="0" anchor="t" anchorCtr="0"/>
+              <a:lstStyle/>
+              <a:p>
+                <a:pPr algn="ctr"/>
+                <a:endParaRPr lang="en-US" dirty="0"/>
+              </a:p>
+              <a:p>
+                <a:pPr algn="ctr"/>
+                <a:r>
+                  <a:rPr lang="en-US" sz="2200" b="1" dirty="0">
+                    <a:solidFill>
+                      <a:srgbClr val="273E52"/>
+                    </a:solidFill>
+                  </a:rPr>
+                  <a:t>Get Predictions</a:t>
+                </a:r>
+              </a:p>
+              <a:p>
+                <a:pPr algn="ctr"/>
+                <a:endParaRPr lang="en-US" sz="2000" b="1" dirty="0">
+                  <a:solidFill>
+                    <a:srgbClr val="273E52"/>
+                  </a:solidFill>
+                </a:endParaRPr>
+              </a:p>
+              <a:p>
+                <a:pPr algn="ctr"/>
+                <a:r>
+                  <a:rPr lang="en-US" dirty="0">
+                    <a:solidFill>
+                      <a:srgbClr val="273E52"/>
+                    </a:solidFill>
+                  </a:rPr>
+                  <a:t>Use the the ‘Predictions’ page to apply the random forest models to predict the genus, family, and species taxonomies.</a:t>
+                </a:r>
+              </a:p>
+              <a:p>
+                <a:pPr algn="ctr"/>
+                <a:endParaRPr lang="en-US" dirty="0">
+                  <a:solidFill>
+                    <a:srgbClr val="273E52"/>
+                  </a:solidFill>
+                </a:endParaRPr>
+              </a:p>
+              <a:p>
+                <a:pPr algn="ctr"/>
+                <a:endParaRPr lang="en-US" sz="1100" dirty="0">
+                  <a:solidFill>
+                    <a:srgbClr val="273E52"/>
+                  </a:solidFill>
+                </a:endParaRPr>
+              </a:p>
+              <a:p>
+                <a:pPr algn="ctr"/>
+                <a:endParaRPr lang="en-US" dirty="0">
+                  <a:solidFill>
+                    <a:srgbClr val="273E52"/>
+                  </a:solidFill>
+                </a:endParaRPr>
+              </a:p>
+              <a:p>
+                <a:pPr algn="ctr"/>
+                <a:r>
+                  <a:rPr lang="en-US" sz="5400" dirty="0">
+                    <a:solidFill>
+                      <a:srgbClr val="273E52"/>
+                    </a:solidFill>
+                  </a:rPr>
+                  <a:t>?</a:t>
+                </a:r>
+                <a:endParaRPr lang="en-US" dirty="0">
+                  <a:solidFill>
+                    <a:srgbClr val="273E52"/>
+                  </a:solidFill>
+                </a:endParaRPr>
+              </a:p>
+            </p:txBody>
+          </p:sp>
+          <p:pic>
+            <p:nvPicPr>
+              <p:cNvPr id="14" name="Graphic 13" descr="Fish with solid fill">
+                <a:extLst>
+                  <a:ext uri="{FF2B5EF4-FFF2-40B4-BE49-F238E27FC236}">
+                    <a16:creationId xmlns:a16="http://schemas.microsoft.com/office/drawing/2014/main" id="{A5C6FEC9-1141-9343-BF19-78FC7BE23C6B}"/>
+                  </a:ext>
+                </a:extLst>
+              </p:cNvPr>
+              <p:cNvPicPr>
+                <a:picLocks noChangeAspect="1"/>
+              </p:cNvPicPr>
+              <p:nvPr/>
+            </p:nvPicPr>
+            <p:blipFill>
+              <a:blip r:embed="rId2">
+                <a:extLst>
+                  <a:ext uri="{96DAC541-7B7A-43D3-8B79-37D633B846F1}">
+                    <asvg:svgBlip xmlns:asvg="http://schemas.microsoft.com/office/drawing/2016/SVG/main" r:embed="rId3"/>
+                  </a:ext>
+                </a:extLst>
+              </a:blip>
+              <a:stretch>
+                <a:fillRect/>
+              </a:stretch>
+            </p:blipFill>
+            <p:spPr>
+              <a:xfrm>
+                <a:off x="4610846" y="4007223"/>
+                <a:ext cx="914400" cy="914400"/>
+              </a:xfrm>
+              <a:prstGeom prst="rect">
+                <a:avLst/>
+              </a:prstGeom>
+            </p:spPr>
+          </p:pic>
+          <p:pic>
+            <p:nvPicPr>
+              <p:cNvPr id="20" name="Graphic 19" descr="Fish outline">
+                <a:extLst>
+                  <a:ext uri="{FF2B5EF4-FFF2-40B4-BE49-F238E27FC236}">
+                    <a16:creationId xmlns:a16="http://schemas.microsoft.com/office/drawing/2014/main" id="{D6B44090-6B69-1847-BAC0-B6A25D4A5979}"/>
+                  </a:ext>
+                </a:extLst>
+              </p:cNvPr>
+              <p:cNvPicPr>
+                <a:picLocks noChangeAspect="1"/>
+              </p:cNvPicPr>
+              <p:nvPr/>
+            </p:nvPicPr>
+            <p:blipFill>
+              <a:blip r:embed="rId4">
+                <a:extLst>
+                  <a:ext uri="{96DAC541-7B7A-43D3-8B79-37D633B846F1}">
+                    <asvg:svgBlip xmlns:asvg="http://schemas.microsoft.com/office/drawing/2016/SVG/main" r:embed="rId5"/>
+                  </a:ext>
+                </a:extLst>
+              </a:blip>
+              <a:stretch>
+                <a:fillRect/>
+              </a:stretch>
+            </p:blipFill>
+            <p:spPr>
+              <a:xfrm>
+                <a:off x="6666755" y="4007223"/>
+                <a:ext cx="914400" cy="914400"/>
+              </a:xfrm>
+              <a:prstGeom prst="rect">
+                <a:avLst/>
+              </a:prstGeom>
+            </p:spPr>
+          </p:pic>
+        </p:grpSp>
+        <p:grpSp>
+          <p:nvGrpSpPr>
+            <p:cNvPr id="5" name="Group 4">
+              <a:extLst>
+                <a:ext uri="{FF2B5EF4-FFF2-40B4-BE49-F238E27FC236}">
+                  <a16:creationId xmlns:a16="http://schemas.microsoft.com/office/drawing/2014/main" id="{3D9B5325-6C3D-A848-A96C-D6AEB3E4821D}"/>
+                </a:ext>
+              </a:extLst>
+            </p:cNvPr>
+            <p:cNvGrpSpPr/>
+            <p:nvPr/>
+          </p:nvGrpSpPr>
+          <p:grpSpPr>
+            <a:xfrm>
+              <a:off x="40337" y="1270747"/>
+              <a:ext cx="3429000" cy="4316506"/>
+              <a:chOff x="242047" y="1270747"/>
+              <a:chExt cx="3429000" cy="4316506"/>
+            </a:xfrm>
+          </p:grpSpPr>
+          <p:sp>
+            <p:nvSpPr>
+              <p:cNvPr id="2" name="Rectangle 1">
+                <a:extLst>
+                  <a:ext uri="{FF2B5EF4-FFF2-40B4-BE49-F238E27FC236}">
+                    <a16:creationId xmlns:a16="http://schemas.microsoft.com/office/drawing/2014/main" id="{D1804843-752D-064D-8D94-EDC959C85515}"/>
+                  </a:ext>
+                </a:extLst>
+              </p:cNvPr>
+              <p:cNvSpPr/>
+              <p:nvPr/>
+            </p:nvSpPr>
+            <p:spPr>
+              <a:xfrm>
+                <a:off x="242047" y="1270747"/>
+                <a:ext cx="3429000" cy="4316506"/>
+              </a:xfrm>
+              <a:prstGeom prst="rect">
+                <a:avLst/>
+              </a:prstGeom>
               <a:solidFill>
-                <a:srgbClr val="273E52"/>
+                <a:srgbClr val="EBF0F1"/>
               </a:solidFill>
-            </a:endParaRPr>
-          </a:p>
-          <a:p>
-            <a:pPr algn="ctr"/>
-            <a:endParaRPr lang="en-US" sz="1100" dirty="0">
-              <a:solidFill>
-                <a:srgbClr val="273E52"/>
-              </a:solidFill>
-            </a:endParaRPr>
-          </a:p>
-          <a:p>
-            <a:pPr algn="ctr"/>
-            <a:endParaRPr lang="en-US" dirty="0">
-              <a:solidFill>
-                <a:srgbClr val="273E52"/>
-              </a:solidFill>
-            </a:endParaRPr>
-          </a:p>
-          <a:p>
-            <a:pPr algn="ctr"/>
-            <a:r>
-              <a:rPr lang="en-US" sz="5400" dirty="0">
-                <a:solidFill>
-                  <a:srgbClr val="273E52"/>
-                </a:solidFill>
-              </a:rPr>
-              <a:t>?</a:t>
-            </a:r>
-            <a:endParaRPr lang="en-US" dirty="0">
-              <a:solidFill>
-                <a:srgbClr val="273E52"/>
-              </a:solidFill>
-            </a:endParaRPr>
-          </a:p>
-        </p:txBody>
-      </p:sp>
-      <p:sp>
-        <p:nvSpPr>
-          <p:cNvPr id="4" name="Rectangle 3">
-            <a:extLst>
-              <a:ext uri="{FF2B5EF4-FFF2-40B4-BE49-F238E27FC236}">
-                <a16:creationId xmlns:a16="http://schemas.microsoft.com/office/drawing/2014/main" id="{25A5C847-EF31-FC44-A922-00378DCF2BE4}"/>
-              </a:ext>
-            </a:extLst>
-          </p:cNvPr>
-          <p:cNvSpPr/>
-          <p:nvPr/>
-        </p:nvSpPr>
-        <p:spPr>
-          <a:xfrm>
-            <a:off x="8520953" y="1270747"/>
-            <a:ext cx="3429000" cy="4316506"/>
-          </a:xfrm>
-          <a:prstGeom prst="rect">
-            <a:avLst/>
-          </a:prstGeom>
-          <a:solidFill>
-            <a:srgbClr val="EBF0F1"/>
-          </a:solidFill>
-          <a:ln>
-            <a:noFill/>
-          </a:ln>
-        </p:spPr>
-        <p:style>
-          <a:lnRef idx="2">
-            <a:schemeClr val="accent1">
-              <a:shade val="50000"/>
-            </a:schemeClr>
-          </a:lnRef>
-          <a:fillRef idx="1">
-            <a:schemeClr val="accent1"/>
-          </a:fillRef>
-          <a:effectRef idx="0">
-            <a:schemeClr val="accent1"/>
-          </a:effectRef>
-          <a:fontRef idx="minor">
-            <a:schemeClr val="lt1"/>
-          </a:fontRef>
-        </p:style>
-        <p:txBody>
-          <a:bodyPr rtlCol="0" anchor="t" anchorCtr="0"/>
-          <a:lstStyle/>
-          <a:p>
-            <a:pPr algn="ctr"/>
-            <a:endParaRPr lang="en-US" b="1" dirty="0">
-              <a:solidFill>
-                <a:srgbClr val="273E52"/>
-              </a:solidFill>
-            </a:endParaRPr>
-          </a:p>
-          <a:p>
-            <a:pPr algn="ctr"/>
-            <a:r>
-              <a:rPr lang="en-US" sz="2200" b="1" dirty="0">
-                <a:solidFill>
-                  <a:srgbClr val="273E52"/>
-                </a:solidFill>
-              </a:rPr>
-              <a:t>Download Predictions</a:t>
-            </a:r>
-          </a:p>
-          <a:p>
-            <a:pPr algn="ctr"/>
-            <a:endParaRPr lang="en-US" sz="2000" b="1" dirty="0">
-              <a:solidFill>
-                <a:srgbClr val="273E52"/>
-              </a:solidFill>
-            </a:endParaRPr>
-          </a:p>
-          <a:p>
-            <a:pPr algn="ctr"/>
-            <a:r>
-              <a:rPr lang="en-US" dirty="0">
-                <a:solidFill>
-                  <a:srgbClr val="273E52"/>
-                </a:solidFill>
-              </a:rPr>
-              <a:t>Use the ‘Downloads’ page to download a spreadsheet with the egg characteristics and corresponding predictions.</a:t>
-            </a:r>
-          </a:p>
-        </p:txBody>
-      </p:sp>
+              <a:ln>
+                <a:noFill/>
+              </a:ln>
+            </p:spPr>
+            <p:style>
+              <a:lnRef idx="2">
+                <a:schemeClr val="accent1">
+                  <a:shade val="50000"/>
+                </a:schemeClr>
+              </a:lnRef>
+              <a:fillRef idx="1">
+                <a:schemeClr val="accent1"/>
+              </a:fillRef>
+              <a:effectRef idx="0">
+                <a:schemeClr val="accent1"/>
+              </a:effectRef>
+              <a:fontRef idx="minor">
+                <a:schemeClr val="lt1"/>
+              </a:fontRef>
+            </p:style>
+            <p:txBody>
+              <a:bodyPr rtlCol="0" anchor="t" anchorCtr="0"/>
+              <a:lstStyle/>
+              <a:p>
+                <a:pPr algn="ctr"/>
+                <a:endParaRPr lang="en-US" sz="2200" b="1" dirty="0">
+                  <a:solidFill>
+                    <a:srgbClr val="273E52"/>
+                  </a:solidFill>
+                </a:endParaRPr>
+              </a:p>
+              <a:p>
+                <a:pPr algn="ctr"/>
+                <a:r>
+                  <a:rPr lang="en-US" sz="2200" b="1" dirty="0">
+                    <a:solidFill>
+                      <a:srgbClr val="273E52"/>
+                    </a:solidFill>
+                  </a:rPr>
+                  <a:t>Provide Egg Characteristics</a:t>
+                </a:r>
+              </a:p>
+              <a:p>
+                <a:pPr algn="ctr"/>
+                <a:endParaRPr lang="en-US" sz="2000" b="1" dirty="0">
+                  <a:solidFill>
+                    <a:srgbClr val="273E52"/>
+                  </a:solidFill>
+                </a:endParaRPr>
+              </a:p>
+              <a:p>
+                <a:pPr algn="ctr"/>
+                <a:r>
+                  <a:rPr lang="en-US" dirty="0">
+                    <a:solidFill>
+                      <a:srgbClr val="273E52"/>
+                    </a:solidFill>
+                  </a:rPr>
+                  <a:t>Use the ‘Data Input’ page to upload a spreadsheet containing characteristics of eggs to obtain predictions</a:t>
+                </a:r>
+              </a:p>
+            </p:txBody>
+          </p:sp>
+          <p:pic>
+            <p:nvPicPr>
+              <p:cNvPr id="29" name="Graphic 28" descr="Ruler outline">
+                <a:extLst>
+                  <a:ext uri="{FF2B5EF4-FFF2-40B4-BE49-F238E27FC236}">
+                    <a16:creationId xmlns:a16="http://schemas.microsoft.com/office/drawing/2014/main" id="{5B597209-2ECA-5F48-94C9-E10FD707D2B2}"/>
+                  </a:ext>
+                </a:extLst>
+              </p:cNvPr>
+              <p:cNvPicPr>
+                <a:picLocks noChangeAspect="1"/>
+              </p:cNvPicPr>
+              <p:nvPr/>
+            </p:nvPicPr>
+            <p:blipFill>
+              <a:blip r:embed="rId6">
+                <a:extLst>
+                  <a:ext uri="{96DAC541-7B7A-43D3-8B79-37D633B846F1}">
+                    <asvg:svgBlip xmlns:asvg="http://schemas.microsoft.com/office/drawing/2016/SVG/main" r:embed="rId7"/>
+                  </a:ext>
+                </a:extLst>
+              </a:blip>
+              <a:stretch>
+                <a:fillRect/>
+              </a:stretch>
+            </p:blipFill>
+            <p:spPr>
+              <a:xfrm>
+                <a:off x="623523" y="3764428"/>
+                <a:ext cx="914400" cy="914400"/>
+              </a:xfrm>
+              <a:prstGeom prst="rect">
+                <a:avLst/>
+              </a:prstGeom>
+            </p:spPr>
+          </p:pic>
+          <p:pic>
+            <p:nvPicPr>
+              <p:cNvPr id="7" name="Graphic 6" descr="Thermometer with solid fill">
+                <a:extLst>
+                  <a:ext uri="{FF2B5EF4-FFF2-40B4-BE49-F238E27FC236}">
+                    <a16:creationId xmlns:a16="http://schemas.microsoft.com/office/drawing/2014/main" id="{B9FF533D-7EC6-7145-8E0E-2B4614B69B32}"/>
+                  </a:ext>
+                </a:extLst>
+              </p:cNvPr>
+              <p:cNvPicPr>
+                <a:picLocks noChangeAspect="1"/>
+              </p:cNvPicPr>
+              <p:nvPr/>
+            </p:nvPicPr>
+            <p:blipFill>
+              <a:blip r:embed="rId8">
+                <a:extLst>
+                  <a:ext uri="{96DAC541-7B7A-43D3-8B79-37D633B846F1}">
+                    <asvg:svgBlip xmlns:asvg="http://schemas.microsoft.com/office/drawing/2016/SVG/main" r:embed="rId9"/>
+                  </a:ext>
+                </a:extLst>
+              </a:blip>
+              <a:stretch>
+                <a:fillRect/>
+              </a:stretch>
+            </p:blipFill>
+            <p:spPr>
+              <a:xfrm>
+                <a:off x="1282434" y="4262343"/>
+                <a:ext cx="914400" cy="914400"/>
+              </a:xfrm>
+              <a:prstGeom prst="rect">
+                <a:avLst/>
+              </a:prstGeom>
+            </p:spPr>
+          </p:pic>
+          <p:pic>
+            <p:nvPicPr>
+              <p:cNvPr id="11" name="Graphic 10" descr="Monthly calendar outline">
+                <a:extLst>
+                  <a:ext uri="{FF2B5EF4-FFF2-40B4-BE49-F238E27FC236}">
+                    <a16:creationId xmlns:a16="http://schemas.microsoft.com/office/drawing/2014/main" id="{418E220F-DA4F-5041-A6B5-CFF009ADE8D7}"/>
+                  </a:ext>
+                </a:extLst>
+              </p:cNvPr>
+              <p:cNvPicPr>
+                <a:picLocks noChangeAspect="1"/>
+              </p:cNvPicPr>
+              <p:nvPr/>
+            </p:nvPicPr>
+            <p:blipFill>
+              <a:blip r:embed="rId10">
+                <a:extLst>
+                  <a:ext uri="{96DAC541-7B7A-43D3-8B79-37D633B846F1}">
+                    <asvg:svgBlip xmlns:asvg="http://schemas.microsoft.com/office/drawing/2016/SVG/main" r:embed="rId11"/>
+                  </a:ext>
+                </a:extLst>
+              </a:blip>
+              <a:stretch>
+                <a:fillRect/>
+              </a:stretch>
+            </p:blipFill>
+            <p:spPr>
+              <a:xfrm>
+                <a:off x="2196834" y="3805143"/>
+                <a:ext cx="914400" cy="914400"/>
+              </a:xfrm>
+              <a:prstGeom prst="rect">
+                <a:avLst/>
+              </a:prstGeom>
+            </p:spPr>
+          </p:pic>
+        </p:grpSp>
+      </p:grpSp>
       <p:graphicFrame>
         <p:nvGraphicFramePr>
           <p:cNvPr id="6" name="Table 6">
@@ -3837,13 +5373,13 @@
           <p:nvPr>
             <p:extLst>
               <p:ext uri="{D42A27DB-BD31-4B8C-83A1-F6EECF244321}">
-                <p14:modId xmlns:p14="http://schemas.microsoft.com/office/powerpoint/2010/main" val="2494332542"/>
+                <p14:modId xmlns:p14="http://schemas.microsoft.com/office/powerpoint/2010/main" val="852746404"/>
               </p:ext>
             </p:extLst>
           </p:nvPr>
         </p:nvGraphicFramePr>
         <p:xfrm>
-          <a:off x="8722664" y="3550023"/>
+          <a:off x="8860873" y="3545470"/>
           <a:ext cx="3071905" cy="1828800"/>
         </p:xfrm>
         <a:graphic>
@@ -4318,278 +5854,475 @@
           </a:graphicData>
         </a:graphic>
       </p:graphicFrame>
-      <p:cxnSp>
-        <p:nvCxnSpPr>
-          <p:cNvPr id="8" name="Straight Arrow Connector 7">
-            <a:extLst>
-              <a:ext uri="{FF2B5EF4-FFF2-40B4-BE49-F238E27FC236}">
-                <a16:creationId xmlns:a16="http://schemas.microsoft.com/office/drawing/2014/main" id="{A3346050-5CF7-E448-A7E5-350B202ED8AA}"/>
-              </a:ext>
-            </a:extLst>
-          </p:cNvPr>
-          <p:cNvCxnSpPr>
-            <a:cxnSpLocks/>
-            <a:stCxn id="2" idx="3"/>
-            <a:endCxn id="3" idx="1"/>
-          </p:cNvCxnSpPr>
-          <p:nvPr/>
-        </p:nvCxnSpPr>
-        <p:spPr>
-          <a:xfrm>
-            <a:off x="3671047" y="3429000"/>
-            <a:ext cx="710453" cy="0"/>
-          </a:xfrm>
-          <a:prstGeom prst="straightConnector1">
-            <a:avLst/>
-          </a:prstGeom>
-          <a:ln w="98425">
-            <a:solidFill>
-              <a:srgbClr val="273E52"/>
-            </a:solidFill>
-            <a:tailEnd type="triangle"/>
-          </a:ln>
-        </p:spPr>
-        <p:style>
-          <a:lnRef idx="1">
-            <a:schemeClr val="accent1"/>
-          </a:lnRef>
-          <a:fillRef idx="0">
-            <a:schemeClr val="accent1"/>
-          </a:fillRef>
-          <a:effectRef idx="0">
-            <a:schemeClr val="accent1"/>
-          </a:effectRef>
-          <a:fontRef idx="minor">
-            <a:schemeClr val="tx1"/>
-          </a:fontRef>
-        </p:style>
-      </p:cxnSp>
-      <p:cxnSp>
-        <p:nvCxnSpPr>
-          <p:cNvPr id="9" name="Straight Arrow Connector 8">
-            <a:extLst>
-              <a:ext uri="{FF2B5EF4-FFF2-40B4-BE49-F238E27FC236}">
-                <a16:creationId xmlns:a16="http://schemas.microsoft.com/office/drawing/2014/main" id="{3259B603-8A86-B941-9849-F8C01C668F12}"/>
-              </a:ext>
-            </a:extLst>
-          </p:cNvPr>
-          <p:cNvCxnSpPr/>
-          <p:nvPr/>
-        </p:nvCxnSpPr>
-        <p:spPr>
-          <a:xfrm>
-            <a:off x="7810500" y="3429000"/>
-            <a:ext cx="710453" cy="0"/>
-          </a:xfrm>
-          <a:prstGeom prst="straightConnector1">
-            <a:avLst/>
-          </a:prstGeom>
-          <a:ln w="98425">
-            <a:solidFill>
-              <a:srgbClr val="273E52"/>
-            </a:solidFill>
-            <a:tailEnd type="triangle"/>
-          </a:ln>
-        </p:spPr>
-        <p:style>
-          <a:lnRef idx="1">
-            <a:schemeClr val="accent1"/>
-          </a:lnRef>
-          <a:fillRef idx="0">
-            <a:schemeClr val="accent1"/>
-          </a:fillRef>
-          <a:effectRef idx="0">
-            <a:schemeClr val="accent1"/>
-          </a:effectRef>
-          <a:fontRef idx="minor">
-            <a:schemeClr val="tx1"/>
-          </a:fontRef>
-        </p:style>
-      </p:cxnSp>
-      <p:pic>
-        <p:nvPicPr>
-          <p:cNvPr id="14" name="Graphic 13" descr="Fish with solid fill">
-            <a:extLst>
-              <a:ext uri="{FF2B5EF4-FFF2-40B4-BE49-F238E27FC236}">
-                <a16:creationId xmlns:a16="http://schemas.microsoft.com/office/drawing/2014/main" id="{A5C6FEC9-1141-9343-BF19-78FC7BE23C6B}"/>
-              </a:ext>
-            </a:extLst>
-          </p:cNvPr>
-          <p:cNvPicPr>
-            <a:picLocks noChangeAspect="1"/>
-          </p:cNvPicPr>
-          <p:nvPr/>
-        </p:nvPicPr>
-        <p:blipFill>
-          <a:blip r:embed="rId2">
-            <a:extLst>
-              <a:ext uri="{96DAC541-7B7A-43D3-8B79-37D633B846F1}">
-                <asvg:svgBlip xmlns:asvg="http://schemas.microsoft.com/office/drawing/2016/SVG/main" r:embed="rId3"/>
-              </a:ext>
-            </a:extLst>
-          </a:blip>
-          <a:stretch>
-            <a:fillRect/>
-          </a:stretch>
-        </p:blipFill>
-        <p:spPr>
-          <a:xfrm>
-            <a:off x="4610846" y="4007223"/>
-            <a:ext cx="914400" cy="914400"/>
-          </a:xfrm>
-          <a:prstGeom prst="rect">
-            <a:avLst/>
-          </a:prstGeom>
-        </p:spPr>
-      </p:pic>
-      <p:pic>
-        <p:nvPicPr>
-          <p:cNvPr id="20" name="Graphic 19" descr="Fish outline">
-            <a:extLst>
-              <a:ext uri="{FF2B5EF4-FFF2-40B4-BE49-F238E27FC236}">
-                <a16:creationId xmlns:a16="http://schemas.microsoft.com/office/drawing/2014/main" id="{D6B44090-6B69-1847-BAC0-B6A25D4A5979}"/>
-              </a:ext>
-            </a:extLst>
-          </p:cNvPr>
-          <p:cNvPicPr>
-            <a:picLocks noChangeAspect="1"/>
-          </p:cNvPicPr>
-          <p:nvPr/>
-        </p:nvPicPr>
-        <p:blipFill>
-          <a:blip r:embed="rId4">
-            <a:extLst>
-              <a:ext uri="{96DAC541-7B7A-43D3-8B79-37D633B846F1}">
-                <asvg:svgBlip xmlns:asvg="http://schemas.microsoft.com/office/drawing/2016/SVG/main" r:embed="rId5"/>
-              </a:ext>
-            </a:extLst>
-          </a:blip>
-          <a:stretch>
-            <a:fillRect/>
-          </a:stretch>
-        </p:blipFill>
-        <p:spPr>
-          <a:xfrm>
-            <a:off x="6666755" y="4007223"/>
-            <a:ext cx="914400" cy="914400"/>
-          </a:xfrm>
-          <a:prstGeom prst="rect">
-            <a:avLst/>
-          </a:prstGeom>
-        </p:spPr>
-      </p:pic>
-      <p:pic>
-        <p:nvPicPr>
-          <p:cNvPr id="29" name="Graphic 28" descr="Ruler outline">
-            <a:extLst>
-              <a:ext uri="{FF2B5EF4-FFF2-40B4-BE49-F238E27FC236}">
-                <a16:creationId xmlns:a16="http://schemas.microsoft.com/office/drawing/2014/main" id="{5B597209-2ECA-5F48-94C9-E10FD707D2B2}"/>
-              </a:ext>
-            </a:extLst>
-          </p:cNvPr>
-          <p:cNvPicPr>
-            <a:picLocks noChangeAspect="1"/>
-          </p:cNvPicPr>
-          <p:nvPr/>
-        </p:nvPicPr>
-        <p:blipFill>
-          <a:blip r:embed="rId6">
-            <a:extLst>
-              <a:ext uri="{96DAC541-7B7A-43D3-8B79-37D633B846F1}">
-                <asvg:svgBlip xmlns:asvg="http://schemas.microsoft.com/office/drawing/2016/SVG/main" r:embed="rId7"/>
-              </a:ext>
-            </a:extLst>
-          </a:blip>
-          <a:stretch>
-            <a:fillRect/>
-          </a:stretch>
-        </p:blipFill>
-        <p:spPr>
-          <a:xfrm>
-            <a:off x="623523" y="3764428"/>
-            <a:ext cx="914400" cy="914400"/>
-          </a:xfrm>
-          <a:prstGeom prst="rect">
-            <a:avLst/>
-          </a:prstGeom>
-        </p:spPr>
-      </p:pic>
-      <p:pic>
-        <p:nvPicPr>
-          <p:cNvPr id="7" name="Graphic 6" descr="Thermometer with solid fill">
-            <a:extLst>
-              <a:ext uri="{FF2B5EF4-FFF2-40B4-BE49-F238E27FC236}">
-                <a16:creationId xmlns:a16="http://schemas.microsoft.com/office/drawing/2014/main" id="{B9FF533D-7EC6-7145-8E0E-2B4614B69B32}"/>
-              </a:ext>
-            </a:extLst>
-          </p:cNvPr>
-          <p:cNvPicPr>
-            <a:picLocks noChangeAspect="1"/>
-          </p:cNvPicPr>
-          <p:nvPr/>
-        </p:nvPicPr>
-        <p:blipFill>
-          <a:blip r:embed="rId8">
-            <a:extLst>
-              <a:ext uri="{96DAC541-7B7A-43D3-8B79-37D633B846F1}">
-                <asvg:svgBlip xmlns:asvg="http://schemas.microsoft.com/office/drawing/2016/SVG/main" r:embed="rId9"/>
-              </a:ext>
-            </a:extLst>
-          </a:blip>
-          <a:stretch>
-            <a:fillRect/>
-          </a:stretch>
-        </p:blipFill>
-        <p:spPr>
-          <a:xfrm>
-            <a:off x="1282434" y="4262343"/>
-            <a:ext cx="914400" cy="914400"/>
-          </a:xfrm>
-          <a:prstGeom prst="rect">
-            <a:avLst/>
-          </a:prstGeom>
-        </p:spPr>
-      </p:pic>
-      <p:pic>
-        <p:nvPicPr>
-          <p:cNvPr id="11" name="Graphic 10" descr="Monthly calendar outline">
-            <a:extLst>
-              <a:ext uri="{FF2B5EF4-FFF2-40B4-BE49-F238E27FC236}">
-                <a16:creationId xmlns:a16="http://schemas.microsoft.com/office/drawing/2014/main" id="{418E220F-DA4F-5041-A6B5-CFF009ADE8D7}"/>
-              </a:ext>
-            </a:extLst>
-          </p:cNvPr>
-          <p:cNvPicPr>
-            <a:picLocks noChangeAspect="1"/>
-          </p:cNvPicPr>
-          <p:nvPr/>
-        </p:nvPicPr>
-        <p:blipFill>
-          <a:blip r:embed="rId10">
-            <a:extLst>
-              <a:ext uri="{96DAC541-7B7A-43D3-8B79-37D633B846F1}">
-                <asvg:svgBlip xmlns:asvg="http://schemas.microsoft.com/office/drawing/2016/SVG/main" r:embed="rId11"/>
-              </a:ext>
-            </a:extLst>
-          </a:blip>
-          <a:stretch>
-            <a:fillRect/>
-          </a:stretch>
-        </p:blipFill>
-        <p:spPr>
-          <a:xfrm>
-            <a:off x="2196834" y="3805143"/>
-            <a:ext cx="914400" cy="914400"/>
-          </a:xfrm>
-          <a:prstGeom prst="rect">
-            <a:avLst/>
-          </a:prstGeom>
-        </p:spPr>
-      </p:pic>
     </p:spTree>
     <p:extLst>
       <p:ext uri="{BB962C8B-B14F-4D97-AF65-F5344CB8AC3E}">
         <p14:creationId xmlns:p14="http://schemas.microsoft.com/office/powerpoint/2010/main" val="282873429"/>
+      </p:ext>
+    </p:extLst>
+  </p:cSld>
+  <p:clrMapOvr>
+    <a:masterClrMapping/>
+  </p:clrMapOvr>
+</p:sld>
+</file>
+
+<file path=ppt/slides/slide6.xml><?xml version="1.0" encoding="utf-8"?>
+<p:sld xmlns:a="http://schemas.openxmlformats.org/drawingml/2006/main" xmlns:r="http://schemas.openxmlformats.org/officeDocument/2006/relationships" xmlns:p="http://schemas.openxmlformats.org/presentationml/2006/main">
+  <p:cSld>
+    <p:spTree>
+      <p:nvGrpSpPr>
+        <p:cNvPr id="1" name=""/>
+        <p:cNvGrpSpPr/>
+        <p:nvPr/>
+      </p:nvGrpSpPr>
+      <p:grpSpPr>
+        <a:xfrm>
+          <a:off x="0" y="0"/>
+          <a:ext cx="0" cy="0"/>
+          <a:chOff x="0" y="0"/>
+          <a:chExt cx="0" cy="0"/>
+        </a:xfrm>
+      </p:grpSpPr>
+      <p:grpSp>
+        <p:nvGrpSpPr>
+          <p:cNvPr id="5" name="Group 4">
+            <a:extLst>
+              <a:ext uri="{FF2B5EF4-FFF2-40B4-BE49-F238E27FC236}">
+                <a16:creationId xmlns:a16="http://schemas.microsoft.com/office/drawing/2014/main" id="{F461A2AB-44BD-DD47-9E98-4DE15B43878C}"/>
+              </a:ext>
+            </a:extLst>
+          </p:cNvPr>
+          <p:cNvGrpSpPr/>
+          <p:nvPr/>
+        </p:nvGrpSpPr>
+        <p:grpSpPr>
+          <a:xfrm>
+            <a:off x="152293" y="1441183"/>
+            <a:ext cx="11887414" cy="3992376"/>
+            <a:chOff x="152293" y="1441183"/>
+            <a:chExt cx="11887414" cy="3992376"/>
+          </a:xfrm>
+        </p:grpSpPr>
+        <p:sp>
+          <p:nvSpPr>
+            <p:cNvPr id="2" name="Rectangle 1">
+              <a:extLst>
+                <a:ext uri="{FF2B5EF4-FFF2-40B4-BE49-F238E27FC236}">
+                  <a16:creationId xmlns:a16="http://schemas.microsoft.com/office/drawing/2014/main" id="{9DA5B0BB-CC6F-0449-8259-978C36672964}"/>
+                </a:ext>
+              </a:extLst>
+            </p:cNvPr>
+            <p:cNvSpPr/>
+            <p:nvPr/>
+          </p:nvSpPr>
+          <p:spPr>
+            <a:xfrm>
+              <a:off x="152293" y="1457927"/>
+              <a:ext cx="3771900" cy="3975632"/>
+            </a:xfrm>
+            <a:prstGeom prst="rect">
+              <a:avLst/>
+            </a:prstGeom>
+            <a:solidFill>
+              <a:srgbClr val="EBF0F1"/>
+            </a:solidFill>
+            <a:ln>
+              <a:noFill/>
+            </a:ln>
+          </p:spPr>
+          <p:style>
+            <a:lnRef idx="2">
+              <a:schemeClr val="accent1">
+                <a:shade val="50000"/>
+              </a:schemeClr>
+            </a:lnRef>
+            <a:fillRef idx="1">
+              <a:schemeClr val="accent1"/>
+            </a:fillRef>
+            <a:effectRef idx="0">
+              <a:schemeClr val="accent1"/>
+            </a:effectRef>
+            <a:fontRef idx="minor">
+              <a:schemeClr val="lt1"/>
+            </a:fontRef>
+          </p:style>
+          <p:txBody>
+            <a:bodyPr rtlCol="0" anchor="t" anchorCtr="0"/>
+            <a:lstStyle/>
+            <a:p>
+              <a:pPr algn="ctr"/>
+              <a:r>
+                <a:rPr lang="en-US" sz="2200" b="1" dirty="0">
+                  <a:solidFill>
+                    <a:srgbClr val="273E52"/>
+                  </a:solidFill>
+                  <a:latin typeface="+mj-lt"/>
+                </a:rPr>
+                <a:t>Columns in Template</a:t>
+              </a:r>
+            </a:p>
+            <a:p>
+              <a:pPr algn="ctr"/>
+              <a:endParaRPr lang="en-US" sz="1100" b="1" dirty="0">
+                <a:solidFill>
+                  <a:srgbClr val="273E52"/>
+                </a:solidFill>
+              </a:endParaRPr>
+            </a:p>
+            <a:p>
+              <a:pPr marL="285750" indent="-285750">
+                <a:buFont typeface="Arial" panose="020B0604020202020204" pitchFamily="34" charset="0"/>
+                <a:buChar char="•"/>
+              </a:pPr>
+              <a:r>
+                <a:rPr lang="en-US" dirty="0">
+                  <a:solidFill>
+                    <a:srgbClr val="273E52"/>
+                  </a:solidFill>
+                  <a:latin typeface="+mj-lt"/>
+                </a:rPr>
+                <a:t>Fill in all variables (egg_ID and 13 egg characteristics)</a:t>
+              </a:r>
+            </a:p>
+            <a:p>
+              <a:pPr marL="285750" indent="-285750">
+                <a:buFont typeface="Arial" panose="020B0604020202020204" pitchFamily="34" charset="0"/>
+                <a:buChar char="•"/>
+              </a:pPr>
+              <a:endParaRPr lang="en-US" dirty="0">
+                <a:solidFill>
+                  <a:srgbClr val="273E52"/>
+                </a:solidFill>
+                <a:latin typeface="+mj-lt"/>
+              </a:endParaRPr>
+            </a:p>
+            <a:p>
+              <a:pPr marL="285750" indent="-285750">
+                <a:buFont typeface="Arial" panose="020B0604020202020204" pitchFamily="34" charset="0"/>
+                <a:buChar char="•"/>
+              </a:pPr>
+              <a:r>
+                <a:rPr lang="en-US" dirty="0">
+                  <a:solidFill>
+                    <a:srgbClr val="273E52"/>
+                  </a:solidFill>
+                  <a:latin typeface="+mj-lt"/>
+                </a:rPr>
+                <a:t>See the help page for detailed definitions of the egg characteristics (includes example photos)</a:t>
+              </a:r>
+            </a:p>
+            <a:p>
+              <a:pPr marL="285750" indent="-285750">
+                <a:buFont typeface="Arial" panose="020B0604020202020204" pitchFamily="34" charset="0"/>
+                <a:buChar char="•"/>
+              </a:pPr>
+              <a:endParaRPr lang="en-US" dirty="0">
+                <a:solidFill>
+                  <a:srgbClr val="273E52"/>
+                </a:solidFill>
+                <a:latin typeface="+mj-lt"/>
+              </a:endParaRPr>
+            </a:p>
+            <a:p>
+              <a:pPr marL="285750" indent="-285750">
+                <a:buFont typeface="Arial" panose="020B0604020202020204" pitchFamily="34" charset="0"/>
+                <a:buChar char="•"/>
+              </a:pPr>
+              <a:r>
+                <a:rPr lang="en-US" dirty="0">
+                  <a:solidFill>
+                    <a:srgbClr val="273E52"/>
+                  </a:solidFill>
+                  <a:latin typeface="+mj-lt"/>
+                </a:rPr>
+                <a:t>There is no maximum to the number of observations that may be included but at least one egg observations is required</a:t>
+              </a:r>
+            </a:p>
+            <a:p>
+              <a:pPr algn="ctr"/>
+              <a:endParaRPr lang="en-US" dirty="0">
+                <a:solidFill>
+                  <a:srgbClr val="273E52"/>
+                </a:solidFill>
+              </a:endParaRPr>
+            </a:p>
+          </p:txBody>
+        </p:sp>
+        <p:sp>
+          <p:nvSpPr>
+            <p:cNvPr id="3" name="Rectangle 2">
+              <a:extLst>
+                <a:ext uri="{FF2B5EF4-FFF2-40B4-BE49-F238E27FC236}">
+                  <a16:creationId xmlns:a16="http://schemas.microsoft.com/office/drawing/2014/main" id="{C0D143B3-20A9-6F4E-9721-0EB654D382E1}"/>
+                </a:ext>
+              </a:extLst>
+            </p:cNvPr>
+            <p:cNvSpPr/>
+            <p:nvPr/>
+          </p:nvSpPr>
+          <p:spPr>
+            <a:xfrm>
+              <a:off x="4210050" y="1451521"/>
+              <a:ext cx="3771900" cy="3975632"/>
+            </a:xfrm>
+            <a:prstGeom prst="rect">
+              <a:avLst/>
+            </a:prstGeom>
+            <a:solidFill>
+              <a:srgbClr val="EBF0F1"/>
+            </a:solidFill>
+            <a:ln>
+              <a:noFill/>
+            </a:ln>
+          </p:spPr>
+          <p:style>
+            <a:lnRef idx="2">
+              <a:schemeClr val="accent1">
+                <a:shade val="50000"/>
+              </a:schemeClr>
+            </a:lnRef>
+            <a:fillRef idx="1">
+              <a:schemeClr val="accent1"/>
+            </a:fillRef>
+            <a:effectRef idx="0">
+              <a:schemeClr val="accent1"/>
+            </a:effectRef>
+            <a:fontRef idx="minor">
+              <a:schemeClr val="lt1"/>
+            </a:fontRef>
+          </p:style>
+          <p:txBody>
+            <a:bodyPr rtlCol="0" anchor="t" anchorCtr="0"/>
+            <a:lstStyle/>
+            <a:p>
+              <a:pPr algn="ctr"/>
+              <a:r>
+                <a:rPr lang="en-US" sz="2200" b="1" dirty="0">
+                  <a:solidFill>
+                    <a:srgbClr val="273E52"/>
+                  </a:solidFill>
+                  <a:latin typeface="+mj-lt"/>
+                </a:rPr>
+                <a:t>Template Formatting Helpers</a:t>
+              </a:r>
+            </a:p>
+            <a:p>
+              <a:pPr algn="ctr"/>
+              <a:endParaRPr lang="en-US" sz="1100" b="1" dirty="0">
+                <a:solidFill>
+                  <a:srgbClr val="273E52"/>
+                </a:solidFill>
+              </a:endParaRPr>
+            </a:p>
+            <a:p>
+              <a:pPr marL="285750" indent="-285750">
+                <a:buFont typeface="Arial" panose="020B0604020202020204" pitchFamily="34" charset="0"/>
+                <a:buChar char="•"/>
+              </a:pPr>
+              <a:r>
+                <a:rPr lang="en-US" dirty="0">
+                  <a:solidFill>
+                    <a:srgbClr val="273E52"/>
+                  </a:solidFill>
+                  <a:latin typeface="+mj-lt"/>
+                </a:rPr>
+                <a:t>Select a cell with a variable name to see required formats, units, or accepted levels</a:t>
+              </a:r>
+            </a:p>
+            <a:p>
+              <a:pPr marL="285750" indent="-285750">
+                <a:buFont typeface="Arial" panose="020B0604020202020204" pitchFamily="34" charset="0"/>
+                <a:buChar char="•"/>
+              </a:pPr>
+              <a:endParaRPr lang="en-US" dirty="0">
+                <a:solidFill>
+                  <a:srgbClr val="273E52"/>
+                </a:solidFill>
+                <a:latin typeface="+mj-lt"/>
+              </a:endParaRPr>
+            </a:p>
+            <a:p>
+              <a:pPr marL="285750" indent="-285750">
+                <a:buFont typeface="Arial" panose="020B0604020202020204" pitchFamily="34" charset="0"/>
+                <a:buChar char="•"/>
+              </a:pPr>
+              <a:r>
+                <a:rPr lang="en-US" dirty="0">
+                  <a:solidFill>
+                    <a:srgbClr val="273E52"/>
+                  </a:solidFill>
+                  <a:latin typeface="+mj-lt"/>
+                </a:rPr>
+                <a:t>Cells of categorical variables contains drop down options  </a:t>
+              </a:r>
+            </a:p>
+            <a:p>
+              <a:pPr marL="285750" indent="-285750">
+                <a:buFont typeface="Arial" panose="020B0604020202020204" pitchFamily="34" charset="0"/>
+                <a:buChar char="•"/>
+              </a:pPr>
+              <a:endParaRPr lang="en-US" dirty="0">
+                <a:solidFill>
+                  <a:srgbClr val="273E52"/>
+                </a:solidFill>
+                <a:latin typeface="+mj-lt"/>
+              </a:endParaRPr>
+            </a:p>
+            <a:p>
+              <a:pPr marL="285750" indent="-285750">
+                <a:buFont typeface="Arial" panose="020B0604020202020204" pitchFamily="34" charset="0"/>
+                <a:buChar char="•"/>
+              </a:pPr>
+              <a:r>
+                <a:rPr lang="en-US" dirty="0">
+                  <a:solidFill>
+                    <a:srgbClr val="273E52"/>
+                  </a:solidFill>
+                  <a:latin typeface="+mj-lt"/>
+                </a:rPr>
+                <a:t>Errors or warnings will appear if a values is not formatted correctly  </a:t>
+              </a:r>
+            </a:p>
+            <a:p>
+              <a:pPr marL="285750" indent="-285750">
+                <a:buFont typeface="Arial" panose="020B0604020202020204" pitchFamily="34" charset="0"/>
+                <a:buChar char="•"/>
+              </a:pPr>
+              <a:endParaRPr lang="en-US" dirty="0">
+                <a:solidFill>
+                  <a:srgbClr val="273E52"/>
+                </a:solidFill>
+              </a:endParaRPr>
+            </a:p>
+          </p:txBody>
+        </p:sp>
+        <p:sp>
+          <p:nvSpPr>
+            <p:cNvPr id="4" name="Rectangle 3">
+              <a:extLst>
+                <a:ext uri="{FF2B5EF4-FFF2-40B4-BE49-F238E27FC236}">
+                  <a16:creationId xmlns:a16="http://schemas.microsoft.com/office/drawing/2014/main" id="{ADE88FDD-E782-7F4B-9932-A77900973971}"/>
+                </a:ext>
+              </a:extLst>
+            </p:cNvPr>
+            <p:cNvSpPr/>
+            <p:nvPr/>
+          </p:nvSpPr>
+          <p:spPr>
+            <a:xfrm>
+              <a:off x="8267807" y="1441183"/>
+              <a:ext cx="3771900" cy="3975632"/>
+            </a:xfrm>
+            <a:prstGeom prst="rect">
+              <a:avLst/>
+            </a:prstGeom>
+            <a:solidFill>
+              <a:srgbClr val="EBF0F1"/>
+            </a:solidFill>
+            <a:ln>
+              <a:noFill/>
+            </a:ln>
+          </p:spPr>
+          <p:style>
+            <a:lnRef idx="2">
+              <a:schemeClr val="accent1">
+                <a:shade val="50000"/>
+              </a:schemeClr>
+            </a:lnRef>
+            <a:fillRef idx="1">
+              <a:schemeClr val="accent1"/>
+            </a:fillRef>
+            <a:effectRef idx="0">
+              <a:schemeClr val="accent1"/>
+            </a:effectRef>
+            <a:fontRef idx="minor">
+              <a:schemeClr val="lt1"/>
+            </a:fontRef>
+          </p:style>
+          <p:txBody>
+            <a:bodyPr rtlCol="0" anchor="t" anchorCtr="0"/>
+            <a:lstStyle/>
+            <a:p>
+              <a:pPr algn="ctr"/>
+              <a:r>
+                <a:rPr lang="en-US" sz="2200" b="1" dirty="0">
+                  <a:solidFill>
+                    <a:srgbClr val="273E52"/>
+                  </a:solidFill>
+                  <a:latin typeface="+mj-lt"/>
+                </a:rPr>
+                <a:t>Additional Variables</a:t>
+              </a:r>
+            </a:p>
+            <a:p>
+              <a:pPr algn="ctr"/>
+              <a:endParaRPr lang="en-US" sz="1100" b="1" dirty="0">
+                <a:solidFill>
+                  <a:srgbClr val="273E52"/>
+                </a:solidFill>
+              </a:endParaRPr>
+            </a:p>
+            <a:p>
+              <a:pPr marL="285750" indent="-285750">
+                <a:buFont typeface="Arial" panose="020B0604020202020204" pitchFamily="34" charset="0"/>
+                <a:buChar char="•"/>
+              </a:pPr>
+              <a:r>
+                <a:rPr lang="en-US" dirty="0">
+                  <a:solidFill>
+                    <a:srgbClr val="273E52"/>
+                  </a:solidFill>
+                  <a:latin typeface="+mj-lt"/>
+                </a:rPr>
+                <a:t>It is okay to include additional variables in the uploaded spreadsheet</a:t>
+              </a:r>
+            </a:p>
+            <a:p>
+              <a:pPr marL="285750" indent="-285750">
+                <a:buFont typeface="Arial" panose="020B0604020202020204" pitchFamily="34" charset="0"/>
+                <a:buChar char="•"/>
+              </a:pPr>
+              <a:endParaRPr lang="en-US" dirty="0">
+                <a:solidFill>
+                  <a:srgbClr val="273E52"/>
+                </a:solidFill>
+                <a:latin typeface="+mj-lt"/>
+              </a:endParaRPr>
+            </a:p>
+            <a:p>
+              <a:pPr marL="285750" indent="-285750">
+                <a:buFont typeface="Arial" panose="020B0604020202020204" pitchFamily="34" charset="0"/>
+                <a:buChar char="•"/>
+              </a:pPr>
+              <a:r>
+                <a:rPr lang="en-US" dirty="0">
+                  <a:solidFill>
+                    <a:srgbClr val="273E52"/>
+                  </a:solidFill>
+                  <a:latin typeface="+mj-lt"/>
+                </a:rPr>
+                <a:t>Additional variables will be excluded from the processed data used for prediction but included in final downloadable spreadsheet</a:t>
+              </a:r>
+            </a:p>
+            <a:p>
+              <a:pPr marL="285750" indent="-285750">
+                <a:buFont typeface="Arial" panose="020B0604020202020204" pitchFamily="34" charset="0"/>
+                <a:buChar char="•"/>
+              </a:pPr>
+              <a:endParaRPr lang="en-US" dirty="0">
+                <a:solidFill>
+                  <a:srgbClr val="273E52"/>
+                </a:solidFill>
+              </a:endParaRPr>
+            </a:p>
+          </p:txBody>
+        </p:sp>
+      </p:grpSp>
+    </p:spTree>
+    <p:extLst>
+      <p:ext uri="{BB962C8B-B14F-4D97-AF65-F5344CB8AC3E}">
+        <p14:creationId xmlns:p14="http://schemas.microsoft.com/office/powerpoint/2010/main" val="1366472483"/>
       </p:ext>
     </p:extLst>
   </p:cSld>

</xml_diff>